<commit_message>
Updated with more details, graphs and WER rates
</commit_message>
<xml_diff>
--- a/project_docs/Group 6 Capstone Project Presentation.pptx
+++ b/project_docs/Group 6 Capstone Project Presentation.pptx
@@ -8,12 +8,12 @@
     <p:sldId id="259" r:id="rId2"/>
     <p:sldId id="261" r:id="rId3"/>
     <p:sldId id="264" r:id="rId4"/>
-    <p:sldId id="263" r:id="rId5"/>
-    <p:sldId id="266" r:id="rId6"/>
-    <p:sldId id="265" r:id="rId7"/>
-    <p:sldId id="257" r:id="rId8"/>
-    <p:sldId id="258" r:id="rId9"/>
-    <p:sldId id="267" r:id="rId10"/>
+    <p:sldId id="268" r:id="rId5"/>
+    <p:sldId id="263" r:id="rId6"/>
+    <p:sldId id="266" r:id="rId7"/>
+    <p:sldId id="269" r:id="rId8"/>
+    <p:sldId id="265" r:id="rId9"/>
+    <p:sldId id="257" r:id="rId10"/>
   </p:sldIdLst>
   <p:sldSz cx="12192000" cy="6858000"/>
   <p:notesSz cx="6858000" cy="9144000"/>
@@ -128,694 +128,6 @@
 </p1510:revInfo>
 </file>
 
-<file path=ppt/changesInfos/changesInfo1.xml><?xml version="1.0" encoding="utf-8"?>
-<pc:chgInfo xmlns:a="http://schemas.openxmlformats.org/drawingml/2006/main" xmlns:r="http://schemas.openxmlformats.org/officeDocument/2006/relationships" xmlns:ac="http://schemas.microsoft.com/office/drawing/2013/main/command" xmlns:pc="http://schemas.microsoft.com/office/powerpoint/2013/main/command">
-  <pc:docChgLst>
-    <pc:chgData name="Ashutosh Singh" userId="8637def5911afb84" providerId="LiveId" clId="{F2D13D7F-537D-4C2C-80A4-C8E242151511}"/>
-    <pc:docChg chg="undo custSel addSld delSld modSld sldOrd">
-      <pc:chgData name="Ashutosh Singh" userId="8637def5911afb84" providerId="LiveId" clId="{F2D13D7F-537D-4C2C-80A4-C8E242151511}" dt="2024-05-04T10:28:04.949" v="1475" actId="1076"/>
-      <pc:docMkLst>
-        <pc:docMk/>
-      </pc:docMkLst>
-      <pc:sldChg chg="addSp delSp modSp del mod">
-        <pc:chgData name="Ashutosh Singh" userId="8637def5911afb84" providerId="LiveId" clId="{F2D13D7F-537D-4C2C-80A4-C8E242151511}" dt="2024-05-04T04:40:59.776" v="207" actId="47"/>
-        <pc:sldMkLst>
-          <pc:docMk/>
-          <pc:sldMk cId="891845286" sldId="256"/>
-        </pc:sldMkLst>
-        <pc:spChg chg="del">
-          <ac:chgData name="Ashutosh Singh" userId="8637def5911afb84" providerId="LiveId" clId="{F2D13D7F-537D-4C2C-80A4-C8E242151511}" dt="2024-05-03T14:40:53.148" v="1" actId="478"/>
-          <ac:spMkLst>
-            <pc:docMk/>
-            <pc:sldMk cId="891845286" sldId="256"/>
-            <ac:spMk id="2" creationId="{0183FCD9-ADD1-615A-153A-72858907529B}"/>
-          </ac:spMkLst>
-        </pc:spChg>
-        <pc:spChg chg="del">
-          <ac:chgData name="Ashutosh Singh" userId="8637def5911afb84" providerId="LiveId" clId="{F2D13D7F-537D-4C2C-80A4-C8E242151511}" dt="2024-05-03T14:40:56.498" v="2" actId="478"/>
-          <ac:spMkLst>
-            <pc:docMk/>
-            <pc:sldMk cId="891845286" sldId="256"/>
-            <ac:spMk id="3" creationId="{0599331F-9F40-1DB4-2FD8-F132CF8374D9}"/>
-          </ac:spMkLst>
-        </pc:spChg>
-        <pc:spChg chg="del">
-          <ac:chgData name="Ashutosh Singh" userId="8637def5911afb84" providerId="LiveId" clId="{F2D13D7F-537D-4C2C-80A4-C8E242151511}" dt="2024-05-03T14:41:00.478" v="3" actId="478"/>
-          <ac:spMkLst>
-            <pc:docMk/>
-            <pc:sldMk cId="891845286" sldId="256"/>
-            <ac:spMk id="4" creationId="{E178036D-2D10-F71E-2DA7-16B69DAAC13E}"/>
-          </ac:spMkLst>
-        </pc:spChg>
-        <pc:spChg chg="add mod">
-          <ac:chgData name="Ashutosh Singh" userId="8637def5911afb84" providerId="LiveId" clId="{F2D13D7F-537D-4C2C-80A4-C8E242151511}" dt="2024-05-03T15:35:55.001" v="4"/>
-          <ac:spMkLst>
-            <pc:docMk/>
-            <pc:sldMk cId="891845286" sldId="256"/>
-            <ac:spMk id="5" creationId="{96A8D8B2-F018-CF40-9182-DB2F712390E8}"/>
-          </ac:spMkLst>
-        </pc:spChg>
-      </pc:sldChg>
-      <pc:sldChg chg="addSp delSp modSp mod">
-        <pc:chgData name="Ashutosh Singh" userId="8637def5911afb84" providerId="LiveId" clId="{F2D13D7F-537D-4C2C-80A4-C8E242151511}" dt="2024-05-04T04:51:47.123" v="278" actId="1076"/>
-        <pc:sldMkLst>
-          <pc:docMk/>
-          <pc:sldMk cId="2261999910" sldId="259"/>
-        </pc:sldMkLst>
-        <pc:spChg chg="mod">
-          <ac:chgData name="Ashutosh Singh" userId="8637def5911afb84" providerId="LiveId" clId="{F2D13D7F-537D-4C2C-80A4-C8E242151511}" dt="2024-05-04T04:51:35.307" v="275" actId="122"/>
-          <ac:spMkLst>
-            <pc:docMk/>
-            <pc:sldMk cId="2261999910" sldId="259"/>
-            <ac:spMk id="2" creationId="{647EA0D2-7549-680C-6912-A8F04E6DABF7}"/>
-          </ac:spMkLst>
-        </pc:spChg>
-        <pc:spChg chg="del mod">
-          <ac:chgData name="Ashutosh Singh" userId="8637def5911afb84" providerId="LiveId" clId="{F2D13D7F-537D-4C2C-80A4-C8E242151511}" dt="2024-05-04T04:47:10.481" v="243" actId="478"/>
-          <ac:spMkLst>
-            <pc:docMk/>
-            <pc:sldMk cId="2261999910" sldId="259"/>
-            <ac:spMk id="3" creationId="{760CD654-DACD-CBAC-B6C0-01293DE69190}"/>
-          </ac:spMkLst>
-        </pc:spChg>
-        <pc:spChg chg="mod">
-          <ac:chgData name="Ashutosh Singh" userId="8637def5911afb84" providerId="LiveId" clId="{F2D13D7F-537D-4C2C-80A4-C8E242151511}" dt="2024-05-04T04:51:42.976" v="277" actId="1076"/>
-          <ac:spMkLst>
-            <pc:docMk/>
-            <pc:sldMk cId="2261999910" sldId="259"/>
-            <ac:spMk id="4" creationId="{B212C859-A0A6-E574-C504-9C23FFCF6D69}"/>
-          </ac:spMkLst>
-        </pc:spChg>
-        <pc:spChg chg="add mod">
-          <ac:chgData name="Ashutosh Singh" userId="8637def5911afb84" providerId="LiveId" clId="{F2D13D7F-537D-4C2C-80A4-C8E242151511}" dt="2024-05-04T04:47:16.131" v="247" actId="20577"/>
-          <ac:spMkLst>
-            <pc:docMk/>
-            <pc:sldMk cId="2261999910" sldId="259"/>
-            <ac:spMk id="5" creationId="{88B7364A-4258-24C6-CC50-AEA7FC7C670C}"/>
-          </ac:spMkLst>
-        </pc:spChg>
-        <pc:spChg chg="add mod">
-          <ac:chgData name="Ashutosh Singh" userId="8637def5911afb84" providerId="LiveId" clId="{F2D13D7F-537D-4C2C-80A4-C8E242151511}" dt="2024-05-04T04:51:47.123" v="278" actId="1076"/>
-          <ac:spMkLst>
-            <pc:docMk/>
-            <pc:sldMk cId="2261999910" sldId="259"/>
-            <ac:spMk id="6" creationId="{D85FB444-16B3-38D3-A6AD-D2C4F8A8AF9D}"/>
-          </ac:spMkLst>
-        </pc:spChg>
-      </pc:sldChg>
-      <pc:sldChg chg="add del">
-        <pc:chgData name="Ashutosh Singh" userId="8637def5911afb84" providerId="LiveId" clId="{F2D13D7F-537D-4C2C-80A4-C8E242151511}" dt="2024-05-04T04:40:58.961" v="206" actId="47"/>
-        <pc:sldMkLst>
-          <pc:docMk/>
-          <pc:sldMk cId="2933750622" sldId="260"/>
-        </pc:sldMkLst>
-      </pc:sldChg>
-      <pc:sldChg chg="addSp delSp modSp add mod ord">
-        <pc:chgData name="Ashutosh Singh" userId="8637def5911afb84" providerId="LiveId" clId="{F2D13D7F-537D-4C2C-80A4-C8E242151511}" dt="2024-05-04T09:47:09.890" v="995" actId="20577"/>
-        <pc:sldMkLst>
-          <pc:docMk/>
-          <pc:sldMk cId="3658136184" sldId="261"/>
-        </pc:sldMkLst>
-        <pc:spChg chg="add del mod">
-          <ac:chgData name="Ashutosh Singh" userId="8637def5911afb84" providerId="LiveId" clId="{F2D13D7F-537D-4C2C-80A4-C8E242151511}" dt="2024-05-04T04:54:30.628" v="279" actId="478"/>
-          <ac:spMkLst>
-            <pc:docMk/>
-            <pc:sldMk cId="3658136184" sldId="261"/>
-            <ac:spMk id="2" creationId="{1C1E6728-7D10-05DA-BE1D-6E07A2C45C96}"/>
-          </ac:spMkLst>
-        </pc:spChg>
-        <pc:spChg chg="add del mod">
-          <ac:chgData name="Ashutosh Singh" userId="8637def5911afb84" providerId="LiveId" clId="{F2D13D7F-537D-4C2C-80A4-C8E242151511}" dt="2024-05-04T04:37:51.064" v="205" actId="478"/>
-          <ac:spMkLst>
-            <pc:docMk/>
-            <pc:sldMk cId="3658136184" sldId="261"/>
-            <ac:spMk id="2" creationId="{28E13C6F-173D-BC5C-2CF9-D2E0F480D826}"/>
-          </ac:spMkLst>
-        </pc:spChg>
-        <pc:spChg chg="add mod">
-          <ac:chgData name="Ashutosh Singh" userId="8637def5911afb84" providerId="LiveId" clId="{F2D13D7F-537D-4C2C-80A4-C8E242151511}" dt="2024-05-04T09:39:19.091" v="736" actId="20577"/>
-          <ac:spMkLst>
-            <pc:docMk/>
-            <pc:sldMk cId="3658136184" sldId="261"/>
-            <ac:spMk id="3" creationId="{3DFCC000-BD5F-EDD9-5A62-5D69546F7A16}"/>
-          </ac:spMkLst>
-        </pc:spChg>
-        <pc:spChg chg="del">
-          <ac:chgData name="Ashutosh Singh" userId="8637def5911afb84" providerId="LiveId" clId="{F2D13D7F-537D-4C2C-80A4-C8E242151511}" dt="2024-05-03T15:39:51.305" v="9" actId="478"/>
-          <ac:spMkLst>
-            <pc:docMk/>
-            <pc:sldMk cId="3658136184" sldId="261"/>
-            <ac:spMk id="5" creationId="{96A8D8B2-F018-CF40-9182-DB2F712390E8}"/>
-          </ac:spMkLst>
-        </pc:spChg>
-        <pc:spChg chg="add mod">
-          <ac:chgData name="Ashutosh Singh" userId="8637def5911afb84" providerId="LiveId" clId="{F2D13D7F-537D-4C2C-80A4-C8E242151511}" dt="2024-05-04T09:18:26.079" v="488" actId="1076"/>
-          <ac:spMkLst>
-            <pc:docMk/>
-            <pc:sldMk cId="3658136184" sldId="261"/>
-            <ac:spMk id="6" creationId="{E3DA2923-D73E-A60F-46E4-1BE59360CA34}"/>
-          </ac:spMkLst>
-        </pc:spChg>
-        <pc:spChg chg="add mod">
-          <ac:chgData name="Ashutosh Singh" userId="8637def5911afb84" providerId="LiveId" clId="{F2D13D7F-537D-4C2C-80A4-C8E242151511}" dt="2024-05-04T09:18:26.079" v="488" actId="1076"/>
-          <ac:spMkLst>
-            <pc:docMk/>
-            <pc:sldMk cId="3658136184" sldId="261"/>
-            <ac:spMk id="11" creationId="{1F7E0580-F9AC-4111-EA24-AB54099B1B8D}"/>
-          </ac:spMkLst>
-        </pc:spChg>
-        <pc:spChg chg="add mod">
-          <ac:chgData name="Ashutosh Singh" userId="8637def5911afb84" providerId="LiveId" clId="{F2D13D7F-537D-4C2C-80A4-C8E242151511}" dt="2024-05-04T09:18:26.079" v="488" actId="1076"/>
-          <ac:spMkLst>
-            <pc:docMk/>
-            <pc:sldMk cId="3658136184" sldId="261"/>
-            <ac:spMk id="45" creationId="{1459E0B7-3419-967C-56AD-0385EE356F9E}"/>
-          </ac:spMkLst>
-        </pc:spChg>
-        <pc:spChg chg="add mod">
-          <ac:chgData name="Ashutosh Singh" userId="8637def5911afb84" providerId="LiveId" clId="{F2D13D7F-537D-4C2C-80A4-C8E242151511}" dt="2024-05-04T09:19:17.957" v="512" actId="113"/>
-          <ac:spMkLst>
-            <pc:docMk/>
-            <pc:sldMk cId="3658136184" sldId="261"/>
-            <ac:spMk id="46" creationId="{AF5FF204-A3B8-2A64-4D1C-F76F29724386}"/>
-          </ac:spMkLst>
-        </pc:spChg>
-        <pc:spChg chg="add mod">
-          <ac:chgData name="Ashutosh Singh" userId="8637def5911afb84" providerId="LiveId" clId="{F2D13D7F-537D-4C2C-80A4-C8E242151511}" dt="2024-05-04T09:44:57.993" v="955" actId="20577"/>
-          <ac:spMkLst>
-            <pc:docMk/>
-            <pc:sldMk cId="3658136184" sldId="261"/>
-            <ac:spMk id="47" creationId="{9C1DB2A0-F572-F9B0-211E-AD6B7BA63B67}"/>
-          </ac:spMkLst>
-        </pc:spChg>
-        <pc:spChg chg="add mod">
-          <ac:chgData name="Ashutosh Singh" userId="8637def5911afb84" providerId="LiveId" clId="{F2D13D7F-537D-4C2C-80A4-C8E242151511}" dt="2024-05-04T09:19:51.760" v="553" actId="1076"/>
-          <ac:spMkLst>
-            <pc:docMk/>
-            <pc:sldMk cId="3658136184" sldId="261"/>
-            <ac:spMk id="48" creationId="{6E2844AD-4155-FD1B-1789-08001FC2A13D}"/>
-          </ac:spMkLst>
-        </pc:spChg>
-        <pc:spChg chg="add mod">
-          <ac:chgData name="Ashutosh Singh" userId="8637def5911afb84" providerId="LiveId" clId="{F2D13D7F-537D-4C2C-80A4-C8E242151511}" dt="2024-05-04T09:20:09.776" v="564" actId="1076"/>
-          <ac:spMkLst>
-            <pc:docMk/>
-            <pc:sldMk cId="3658136184" sldId="261"/>
-            <ac:spMk id="49" creationId="{8C15CFD8-3F60-549D-3E21-95AEF4E4A8B3}"/>
-          </ac:spMkLst>
-        </pc:spChg>
-        <pc:spChg chg="add mod">
-          <ac:chgData name="Ashutosh Singh" userId="8637def5911afb84" providerId="LiveId" clId="{F2D13D7F-537D-4C2C-80A4-C8E242151511}" dt="2024-05-04T09:20:28.766" v="584" actId="1076"/>
-          <ac:spMkLst>
-            <pc:docMk/>
-            <pc:sldMk cId="3658136184" sldId="261"/>
-            <ac:spMk id="50" creationId="{E4553288-4FCC-35CF-E417-A2399CCB530E}"/>
-          </ac:spMkLst>
-        </pc:spChg>
-        <pc:spChg chg="add mod">
-          <ac:chgData name="Ashutosh Singh" userId="8637def5911afb84" providerId="LiveId" clId="{F2D13D7F-537D-4C2C-80A4-C8E242151511}" dt="2024-05-04T09:37:19.838" v="707" actId="20577"/>
-          <ac:spMkLst>
-            <pc:docMk/>
-            <pc:sldMk cId="3658136184" sldId="261"/>
-            <ac:spMk id="51" creationId="{E9883968-D68A-1806-AA4B-1244F89C330E}"/>
-          </ac:spMkLst>
-        </pc:spChg>
-        <pc:spChg chg="add mod">
-          <ac:chgData name="Ashutosh Singh" userId="8637def5911afb84" providerId="LiveId" clId="{F2D13D7F-537D-4C2C-80A4-C8E242151511}" dt="2024-05-04T09:37:52.119" v="721" actId="1076"/>
-          <ac:spMkLst>
-            <pc:docMk/>
-            <pc:sldMk cId="3658136184" sldId="261"/>
-            <ac:spMk id="52" creationId="{00993388-F0A6-B770-3937-C549EA5655A4}"/>
-          </ac:spMkLst>
-        </pc:spChg>
-        <pc:spChg chg="add mod">
-          <ac:chgData name="Ashutosh Singh" userId="8637def5911afb84" providerId="LiveId" clId="{F2D13D7F-537D-4C2C-80A4-C8E242151511}" dt="2024-05-04T09:37:34.604" v="713" actId="20577"/>
-          <ac:spMkLst>
-            <pc:docMk/>
-            <pc:sldMk cId="3658136184" sldId="261"/>
-            <ac:spMk id="53" creationId="{2AC5740F-F12F-4C44-C332-9373CC5AFE5F}"/>
-          </ac:spMkLst>
-        </pc:spChg>
-        <pc:spChg chg="add mod">
-          <ac:chgData name="Ashutosh Singh" userId="8637def5911afb84" providerId="LiveId" clId="{F2D13D7F-537D-4C2C-80A4-C8E242151511}" dt="2024-05-04T09:37:59.359" v="725" actId="20577"/>
-          <ac:spMkLst>
-            <pc:docMk/>
-            <pc:sldMk cId="3658136184" sldId="261"/>
-            <ac:spMk id="54" creationId="{C3C99644-6175-A073-A775-59A53642B067}"/>
-          </ac:spMkLst>
-        </pc:spChg>
-        <pc:spChg chg="add del mod">
-          <ac:chgData name="Ashutosh Singh" userId="8637def5911afb84" providerId="LiveId" clId="{F2D13D7F-537D-4C2C-80A4-C8E242151511}" dt="2024-05-04T09:40:13.559" v="739"/>
-          <ac:spMkLst>
-            <pc:docMk/>
-            <pc:sldMk cId="3658136184" sldId="261"/>
-            <ac:spMk id="55" creationId="{CAACB5A5-4CA8-D79D-B4AA-591C66DD92BF}"/>
-          </ac:spMkLst>
-        </pc:spChg>
-        <pc:spChg chg="add mod">
-          <ac:chgData name="Ashutosh Singh" userId="8637def5911afb84" providerId="LiveId" clId="{F2D13D7F-537D-4C2C-80A4-C8E242151511}" dt="2024-05-04T09:38:38.066" v="733" actId="20577"/>
-          <ac:spMkLst>
-            <pc:docMk/>
-            <pc:sldMk cId="3658136184" sldId="261"/>
-            <ac:spMk id="56" creationId="{8CB8C453-6DE6-2D49-0B6A-71DBA7D8C686}"/>
-          </ac:spMkLst>
-        </pc:spChg>
-        <pc:spChg chg="add mod">
-          <ac:chgData name="Ashutosh Singh" userId="8637def5911afb84" providerId="LiveId" clId="{F2D13D7F-537D-4C2C-80A4-C8E242151511}" dt="2024-05-04T09:45:45.580" v="973" actId="20577"/>
-          <ac:spMkLst>
-            <pc:docMk/>
-            <pc:sldMk cId="3658136184" sldId="261"/>
-            <ac:spMk id="57" creationId="{26789BFC-BBC5-9713-ECF3-BA14AE56E4EE}"/>
-          </ac:spMkLst>
-        </pc:spChg>
-        <pc:spChg chg="add mod">
-          <ac:chgData name="Ashutosh Singh" userId="8637def5911afb84" providerId="LiveId" clId="{F2D13D7F-537D-4C2C-80A4-C8E242151511}" dt="2024-05-04T09:40:52.110" v="779" actId="20577"/>
-          <ac:spMkLst>
-            <pc:docMk/>
-            <pc:sldMk cId="3658136184" sldId="261"/>
-            <ac:spMk id="58" creationId="{3D3C08A2-102F-A74E-E76C-68646ACC43E7}"/>
-          </ac:spMkLst>
-        </pc:spChg>
-        <pc:spChg chg="add mod">
-          <ac:chgData name="Ashutosh Singh" userId="8637def5911afb84" providerId="LiveId" clId="{F2D13D7F-537D-4C2C-80A4-C8E242151511}" dt="2024-05-04T09:47:09.890" v="995" actId="20577"/>
-          <ac:spMkLst>
-            <pc:docMk/>
-            <pc:sldMk cId="3658136184" sldId="261"/>
-            <ac:spMk id="59" creationId="{36C23084-07E4-6D5F-B812-02955A42BEDC}"/>
-          </ac:spMkLst>
-        </pc:spChg>
-        <pc:picChg chg="add del mod">
-          <ac:chgData name="Ashutosh Singh" userId="8637def5911afb84" providerId="LiveId" clId="{F2D13D7F-537D-4C2C-80A4-C8E242151511}" dt="2024-05-04T09:13:20.977" v="428" actId="478"/>
-          <ac:picMkLst>
-            <pc:docMk/>
-            <pc:sldMk cId="3658136184" sldId="261"/>
-            <ac:picMk id="5" creationId="{BAA21158-393E-7704-2D66-28C2DA66C1BD}"/>
-          </ac:picMkLst>
-        </pc:picChg>
-        <pc:picChg chg="add mod">
-          <ac:chgData name="Ashutosh Singh" userId="8637def5911afb84" providerId="LiveId" clId="{F2D13D7F-537D-4C2C-80A4-C8E242151511}" dt="2024-05-04T09:18:26.079" v="488" actId="1076"/>
-          <ac:picMkLst>
-            <pc:docMk/>
-            <pc:sldMk cId="3658136184" sldId="261"/>
-            <ac:picMk id="8" creationId="{E518716C-FA2C-F47E-8C07-BE5B2C928241}"/>
-          </ac:picMkLst>
-        </pc:picChg>
-        <pc:picChg chg="add mod">
-          <ac:chgData name="Ashutosh Singh" userId="8637def5911afb84" providerId="LiveId" clId="{F2D13D7F-537D-4C2C-80A4-C8E242151511}" dt="2024-05-04T09:18:26.079" v="488" actId="1076"/>
-          <ac:picMkLst>
-            <pc:docMk/>
-            <pc:sldMk cId="3658136184" sldId="261"/>
-            <ac:picMk id="10" creationId="{D45E1540-DDB7-E29D-5304-C3B7EF5C3D9F}"/>
-          </ac:picMkLst>
-        </pc:picChg>
-        <pc:picChg chg="add mod">
-          <ac:chgData name="Ashutosh Singh" userId="8637def5911afb84" providerId="LiveId" clId="{F2D13D7F-537D-4C2C-80A4-C8E242151511}" dt="2024-05-04T09:18:26.079" v="488" actId="1076"/>
-          <ac:picMkLst>
-            <pc:docMk/>
-            <pc:sldMk cId="3658136184" sldId="261"/>
-            <ac:picMk id="13" creationId="{337B3E68-385D-4F41-58BB-C943C4E92263}"/>
-          </ac:picMkLst>
-        </pc:picChg>
-        <pc:picChg chg="add del mod">
-          <ac:chgData name="Ashutosh Singh" userId="8637def5911afb84" providerId="LiveId" clId="{F2D13D7F-537D-4C2C-80A4-C8E242151511}" dt="2024-05-04T09:13:22.666" v="429" actId="478"/>
-          <ac:picMkLst>
-            <pc:docMk/>
-            <pc:sldMk cId="3658136184" sldId="261"/>
-            <ac:picMk id="14" creationId="{7BE5959D-A150-A6D0-14F8-98A17E443070}"/>
-          </ac:picMkLst>
-        </pc:picChg>
-        <pc:picChg chg="add del mod">
-          <ac:chgData name="Ashutosh Singh" userId="8637def5911afb84" providerId="LiveId" clId="{F2D13D7F-537D-4C2C-80A4-C8E242151511}" dt="2024-05-04T09:15:15.192" v="467" actId="478"/>
-          <ac:picMkLst>
-            <pc:docMk/>
-            <pc:sldMk cId="3658136184" sldId="261"/>
-            <ac:picMk id="15" creationId="{03571599-891C-1206-7FC7-7AC9A29BC675}"/>
-          </ac:picMkLst>
-        </pc:picChg>
-        <pc:picChg chg="add mod">
-          <ac:chgData name="Ashutosh Singh" userId="8637def5911afb84" providerId="LiveId" clId="{F2D13D7F-537D-4C2C-80A4-C8E242151511}" dt="2024-05-04T09:18:26.079" v="488" actId="1076"/>
-          <ac:picMkLst>
-            <pc:docMk/>
-            <pc:sldMk cId="3658136184" sldId="261"/>
-            <ac:picMk id="38" creationId="{0E807389-ED35-ECE0-7A8E-E51063468636}"/>
-          </ac:picMkLst>
-        </pc:picChg>
-        <pc:cxnChg chg="add mod">
-          <ac:chgData name="Ashutosh Singh" userId="8637def5911afb84" providerId="LiveId" clId="{F2D13D7F-537D-4C2C-80A4-C8E242151511}" dt="2024-05-04T09:18:26.079" v="488" actId="1076"/>
-          <ac:cxnSpMkLst>
-            <pc:docMk/>
-            <pc:sldMk cId="3658136184" sldId="261"/>
-            <ac:cxnSpMk id="17" creationId="{D36C54AE-83C3-CFDA-6BFB-739BB0D488B6}"/>
-          </ac:cxnSpMkLst>
-        </pc:cxnChg>
-        <pc:cxnChg chg="add mod">
-          <ac:chgData name="Ashutosh Singh" userId="8637def5911afb84" providerId="LiveId" clId="{F2D13D7F-537D-4C2C-80A4-C8E242151511}" dt="2024-05-04T09:18:26.079" v="488" actId="1076"/>
-          <ac:cxnSpMkLst>
-            <pc:docMk/>
-            <pc:sldMk cId="3658136184" sldId="261"/>
-            <ac:cxnSpMk id="23" creationId="{FBC5ACC3-A67D-F93F-9B23-0BD41E374CB2}"/>
-          </ac:cxnSpMkLst>
-        </pc:cxnChg>
-        <pc:cxnChg chg="add mod">
-          <ac:chgData name="Ashutosh Singh" userId="8637def5911afb84" providerId="LiveId" clId="{F2D13D7F-537D-4C2C-80A4-C8E242151511}" dt="2024-05-04T09:18:26.079" v="488" actId="1076"/>
-          <ac:cxnSpMkLst>
-            <pc:docMk/>
-            <pc:sldMk cId="3658136184" sldId="261"/>
-            <ac:cxnSpMk id="26" creationId="{2BD0F9E0-52C6-74F1-B20F-B0291412AA8A}"/>
-          </ac:cxnSpMkLst>
-        </pc:cxnChg>
-        <pc:cxnChg chg="add mod">
-          <ac:chgData name="Ashutosh Singh" userId="8637def5911afb84" providerId="LiveId" clId="{F2D13D7F-537D-4C2C-80A4-C8E242151511}" dt="2024-05-04T09:18:26.079" v="488" actId="1076"/>
-          <ac:cxnSpMkLst>
-            <pc:docMk/>
-            <pc:sldMk cId="3658136184" sldId="261"/>
-            <ac:cxnSpMk id="29" creationId="{3680D1A7-8816-95FC-C462-01504D15D322}"/>
-          </ac:cxnSpMkLst>
-        </pc:cxnChg>
-        <pc:cxnChg chg="add mod">
-          <ac:chgData name="Ashutosh Singh" userId="8637def5911afb84" providerId="LiveId" clId="{F2D13D7F-537D-4C2C-80A4-C8E242151511}" dt="2024-05-04T09:18:26.079" v="488" actId="1076"/>
-          <ac:cxnSpMkLst>
-            <pc:docMk/>
-            <pc:sldMk cId="3658136184" sldId="261"/>
-            <ac:cxnSpMk id="33" creationId="{24B4DE4A-C047-17DE-4945-9D622F830EB6}"/>
-          </ac:cxnSpMkLst>
-        </pc:cxnChg>
-      </pc:sldChg>
-      <pc:sldChg chg="addSp delSp modSp add del mod">
-        <pc:chgData name="Ashutosh Singh" userId="8637def5911afb84" providerId="LiveId" clId="{F2D13D7F-537D-4C2C-80A4-C8E242151511}" dt="2024-05-04T09:41:10.340" v="808" actId="47"/>
-        <pc:sldMkLst>
-          <pc:docMk/>
-          <pc:sldMk cId="4237350326" sldId="262"/>
-        </pc:sldMkLst>
-        <pc:spChg chg="del mod">
-          <ac:chgData name="Ashutosh Singh" userId="8637def5911afb84" providerId="LiveId" clId="{F2D13D7F-537D-4C2C-80A4-C8E242151511}" dt="2024-05-04T04:35:37.472" v="105" actId="478"/>
-          <ac:spMkLst>
-            <pc:docMk/>
-            <pc:sldMk cId="4237350326" sldId="262"/>
-            <ac:spMk id="2" creationId="{28E13C6F-173D-BC5C-2CF9-D2E0F480D826}"/>
-          </ac:spMkLst>
-        </pc:spChg>
-        <pc:spChg chg="add mod">
-          <ac:chgData name="Ashutosh Singh" userId="8637def5911afb84" providerId="LiveId" clId="{F2D13D7F-537D-4C2C-80A4-C8E242151511}" dt="2024-05-04T04:36:43.558" v="204" actId="14100"/>
-          <ac:spMkLst>
-            <pc:docMk/>
-            <pc:sldMk cId="4237350326" sldId="262"/>
-            <ac:spMk id="3" creationId="{E8AB0769-8F7D-B6A0-197A-5E3106619710}"/>
-          </ac:spMkLst>
-        </pc:spChg>
-      </pc:sldChg>
-      <pc:sldChg chg="addSp delSp modSp add mod">
-        <pc:chgData name="Ashutosh Singh" userId="8637def5911afb84" providerId="LiveId" clId="{F2D13D7F-537D-4C2C-80A4-C8E242151511}" dt="2024-05-04T10:28:04.949" v="1475" actId="1076"/>
-        <pc:sldMkLst>
-          <pc:docMk/>
-          <pc:sldMk cId="1306230644" sldId="263"/>
-        </pc:sldMkLst>
-        <pc:spChg chg="mod">
-          <ac:chgData name="Ashutosh Singh" userId="8637def5911afb84" providerId="LiveId" clId="{F2D13D7F-537D-4C2C-80A4-C8E242151511}" dt="2024-05-04T10:13:10.752" v="1209" actId="20577"/>
-          <ac:spMkLst>
-            <pc:docMk/>
-            <pc:sldMk cId="1306230644" sldId="263"/>
-            <ac:spMk id="2" creationId="{28E13C6F-173D-BC5C-2CF9-D2E0F480D826}"/>
-          </ac:spMkLst>
-        </pc:spChg>
-        <pc:spChg chg="add del mod">
-          <ac:chgData name="Ashutosh Singh" userId="8637def5911afb84" providerId="LiveId" clId="{F2D13D7F-537D-4C2C-80A4-C8E242151511}" dt="2024-05-04T10:13:13.845" v="1210" actId="478"/>
-          <ac:spMkLst>
-            <pc:docMk/>
-            <pc:sldMk cId="1306230644" sldId="263"/>
-            <ac:spMk id="4" creationId="{31A56A38-2457-AE5F-9E9A-4BD8AD8FBA76}"/>
-          </ac:spMkLst>
-        </pc:spChg>
-        <pc:spChg chg="add mod">
-          <ac:chgData name="Ashutosh Singh" userId="8637def5911afb84" providerId="LiveId" clId="{F2D13D7F-537D-4C2C-80A4-C8E242151511}" dt="2024-05-04T10:24:58.378" v="1408" actId="14100"/>
-          <ac:spMkLst>
-            <pc:docMk/>
-            <pc:sldMk cId="1306230644" sldId="263"/>
-            <ac:spMk id="14" creationId="{86119567-FA02-4645-D1EB-9A1C99F5E98E}"/>
-          </ac:spMkLst>
-        </pc:spChg>
-        <pc:spChg chg="add mod">
-          <ac:chgData name="Ashutosh Singh" userId="8637def5911afb84" providerId="LiveId" clId="{F2D13D7F-537D-4C2C-80A4-C8E242151511}" dt="2024-05-04T10:26:31.558" v="1442" actId="14100"/>
-          <ac:spMkLst>
-            <pc:docMk/>
-            <pc:sldMk cId="1306230644" sldId="263"/>
-            <ac:spMk id="15" creationId="{CBB3D580-5AFE-B5A3-65E0-28497D4AC858}"/>
-          </ac:spMkLst>
-        </pc:spChg>
-        <pc:spChg chg="add mod">
-          <ac:chgData name="Ashutosh Singh" userId="8637def5911afb84" providerId="LiveId" clId="{F2D13D7F-537D-4C2C-80A4-C8E242151511}" dt="2024-05-04T10:25:49.992" v="1427" actId="1076"/>
-          <ac:spMkLst>
-            <pc:docMk/>
-            <pc:sldMk cId="1306230644" sldId="263"/>
-            <ac:spMk id="17" creationId="{146A84AF-24C4-2F5F-AE78-E7364D472987}"/>
-          </ac:spMkLst>
-        </pc:spChg>
-        <pc:spChg chg="add del mod">
-          <ac:chgData name="Ashutosh Singh" userId="8637def5911afb84" providerId="LiveId" clId="{F2D13D7F-537D-4C2C-80A4-C8E242151511}" dt="2024-05-04T10:27:22.699" v="1451" actId="478"/>
-          <ac:spMkLst>
-            <pc:docMk/>
-            <pc:sldMk cId="1306230644" sldId="263"/>
-            <ac:spMk id="18" creationId="{D3272027-6DAE-9531-4609-098C21D36FF4}"/>
-          </ac:spMkLst>
-        </pc:spChg>
-        <pc:spChg chg="add mod">
-          <ac:chgData name="Ashutosh Singh" userId="8637def5911afb84" providerId="LiveId" clId="{F2D13D7F-537D-4C2C-80A4-C8E242151511}" dt="2024-05-04T10:27:29.769" v="1452" actId="1076"/>
-          <ac:spMkLst>
-            <pc:docMk/>
-            <pc:sldMk cId="1306230644" sldId="263"/>
-            <ac:spMk id="20" creationId="{C5CA9786-0D08-0B86-DE26-22CFC5E962FE}"/>
-          </ac:spMkLst>
-        </pc:spChg>
-        <pc:spChg chg="add mod">
-          <ac:chgData name="Ashutosh Singh" userId="8637def5911afb84" providerId="LiveId" clId="{F2D13D7F-537D-4C2C-80A4-C8E242151511}" dt="2024-05-04T10:28:04.949" v="1475" actId="1076"/>
-          <ac:spMkLst>
-            <pc:docMk/>
-            <pc:sldMk cId="1306230644" sldId="263"/>
-            <ac:spMk id="23" creationId="{E2CE7243-A7B1-A4AA-4025-CC6F53AEBFF7}"/>
-          </ac:spMkLst>
-        </pc:spChg>
-        <pc:picChg chg="add mod">
-          <ac:chgData name="Ashutosh Singh" userId="8637def5911afb84" providerId="LiveId" clId="{F2D13D7F-537D-4C2C-80A4-C8E242151511}" dt="2024-05-04T10:23:00.384" v="1333" actId="1076"/>
-          <ac:picMkLst>
-            <pc:docMk/>
-            <pc:sldMk cId="1306230644" sldId="263"/>
-            <ac:picMk id="5" creationId="{9B1069C8-12DC-E6BA-A614-1F0D070B35B5}"/>
-          </ac:picMkLst>
-        </pc:picChg>
-        <pc:picChg chg="add mod">
-          <ac:chgData name="Ashutosh Singh" userId="8637def5911afb84" providerId="LiveId" clId="{F2D13D7F-537D-4C2C-80A4-C8E242151511}" dt="2024-05-04T10:23:17.676" v="1334" actId="408"/>
-          <ac:picMkLst>
-            <pc:docMk/>
-            <pc:sldMk cId="1306230644" sldId="263"/>
-            <ac:picMk id="7" creationId="{05B57275-D449-EAEE-F599-AFE7106C7776}"/>
-          </ac:picMkLst>
-        </pc:picChg>
-        <pc:picChg chg="add mod">
-          <ac:chgData name="Ashutosh Singh" userId="8637def5911afb84" providerId="LiveId" clId="{F2D13D7F-537D-4C2C-80A4-C8E242151511}" dt="2024-05-04T10:22:47.416" v="1332" actId="1582"/>
-          <ac:picMkLst>
-            <pc:docMk/>
-            <pc:sldMk cId="1306230644" sldId="263"/>
-            <ac:picMk id="9" creationId="{3652530A-6CD7-284F-91AB-0B398A92B4C4}"/>
-          </ac:picMkLst>
-        </pc:picChg>
-        <pc:picChg chg="add del mod">
-          <ac:chgData name="Ashutosh Singh" userId="8637def5911afb84" providerId="LiveId" clId="{F2D13D7F-537D-4C2C-80A4-C8E242151511}" dt="2024-05-04T10:27:20.884" v="1450" actId="478"/>
-          <ac:picMkLst>
-            <pc:docMk/>
-            <pc:sldMk cId="1306230644" sldId="263"/>
-            <ac:picMk id="11" creationId="{31B3A05A-9F51-AFCC-6A75-60D2953FCDB7}"/>
-          </ac:picMkLst>
-        </pc:picChg>
-        <pc:picChg chg="add mod">
-          <ac:chgData name="Ashutosh Singh" userId="8637def5911afb84" providerId="LiveId" clId="{F2D13D7F-537D-4C2C-80A4-C8E242151511}" dt="2024-05-04T10:27:29.769" v="1452" actId="1076"/>
-          <ac:picMkLst>
-            <pc:docMk/>
-            <pc:sldMk cId="1306230644" sldId="263"/>
-            <ac:picMk id="12" creationId="{09F224FB-C3FC-6C84-25E7-F892E3DC9E73}"/>
-          </ac:picMkLst>
-        </pc:picChg>
-        <pc:picChg chg="add del mod">
-          <ac:chgData name="Ashutosh Singh" userId="8637def5911afb84" providerId="LiveId" clId="{F2D13D7F-537D-4C2C-80A4-C8E242151511}" dt="2024-05-04T10:27:44.221" v="1456" actId="478"/>
-          <ac:picMkLst>
-            <pc:docMk/>
-            <pc:sldMk cId="1306230644" sldId="263"/>
-            <ac:picMk id="21" creationId="{4FAD50DF-D432-7459-0C1C-EE62A6830289}"/>
-          </ac:picMkLst>
-        </pc:picChg>
-        <pc:picChg chg="add mod">
-          <ac:chgData name="Ashutosh Singh" userId="8637def5911afb84" providerId="LiveId" clId="{F2D13D7F-537D-4C2C-80A4-C8E242151511}" dt="2024-05-04T10:27:46.665" v="1457" actId="1076"/>
-          <ac:picMkLst>
-            <pc:docMk/>
-            <pc:sldMk cId="1306230644" sldId="263"/>
-            <ac:picMk id="22" creationId="{95A0A70E-D134-B365-2879-B7F5B707AC71}"/>
-          </ac:picMkLst>
-        </pc:picChg>
-      </pc:sldChg>
-      <pc:sldChg chg="delSp add del mod">
-        <pc:chgData name="Ashutosh Singh" userId="8637def5911afb84" providerId="LiveId" clId="{F2D13D7F-537D-4C2C-80A4-C8E242151511}" dt="2024-05-04T04:35:05.404" v="63" actId="47"/>
-        <pc:sldMkLst>
-          <pc:docMk/>
-          <pc:sldMk cId="689870432" sldId="264"/>
-        </pc:sldMkLst>
-        <pc:spChg chg="del">
-          <ac:chgData name="Ashutosh Singh" userId="8637def5911afb84" providerId="LiveId" clId="{F2D13D7F-537D-4C2C-80A4-C8E242151511}" dt="2024-05-04T04:35:03.009" v="62" actId="478"/>
-          <ac:spMkLst>
-            <pc:docMk/>
-            <pc:sldMk cId="689870432" sldId="264"/>
-            <ac:spMk id="2" creationId="{28E13C6F-173D-BC5C-2CF9-D2E0F480D826}"/>
-          </ac:spMkLst>
-        </pc:spChg>
-      </pc:sldChg>
-      <pc:sldChg chg="addSp delSp modSp add mod ord">
-        <pc:chgData name="Ashutosh Singh" userId="8637def5911afb84" providerId="LiveId" clId="{F2D13D7F-537D-4C2C-80A4-C8E242151511}" dt="2024-05-04T10:13:01.293" v="1193" actId="20577"/>
-        <pc:sldMkLst>
-          <pc:docMk/>
-          <pc:sldMk cId="3745461267" sldId="264"/>
-        </pc:sldMkLst>
-        <pc:spChg chg="mod">
-          <ac:chgData name="Ashutosh Singh" userId="8637def5911afb84" providerId="LiveId" clId="{F2D13D7F-537D-4C2C-80A4-C8E242151511}" dt="2024-05-04T09:42:08.649" v="870" actId="20577"/>
-          <ac:spMkLst>
-            <pc:docMk/>
-            <pc:sldMk cId="3745461267" sldId="264"/>
-            <ac:spMk id="2" creationId="{28E13C6F-173D-BC5C-2CF9-D2E0F480D826}"/>
-          </ac:spMkLst>
-        </pc:spChg>
-        <pc:spChg chg="add mod">
-          <ac:chgData name="Ashutosh Singh" userId="8637def5911afb84" providerId="LiveId" clId="{F2D13D7F-537D-4C2C-80A4-C8E242151511}" dt="2024-05-04T10:13:01.293" v="1193" actId="20577"/>
-          <ac:spMkLst>
-            <pc:docMk/>
-            <pc:sldMk cId="3745461267" sldId="264"/>
-            <ac:spMk id="3" creationId="{53EAE4CA-504C-8CB4-22B7-7CFAEB4EE190}"/>
-          </ac:spMkLst>
-        </pc:spChg>
-        <pc:spChg chg="add del mod">
-          <ac:chgData name="Ashutosh Singh" userId="8637def5911afb84" providerId="LiveId" clId="{F2D13D7F-537D-4C2C-80A4-C8E242151511}" dt="2024-05-04T10:12:46.022" v="1141" actId="478"/>
-          <ac:spMkLst>
-            <pc:docMk/>
-            <pc:sldMk cId="3745461267" sldId="264"/>
-            <ac:spMk id="4" creationId="{2DF41B36-EFD5-A952-95EE-C0392FA720C3}"/>
-          </ac:spMkLst>
-        </pc:spChg>
-      </pc:sldChg>
-      <pc:sldChg chg="modSp add del mod ord">
-        <pc:chgData name="Ashutosh Singh" userId="8637def5911afb84" providerId="LiveId" clId="{F2D13D7F-537D-4C2C-80A4-C8E242151511}" dt="2024-05-04T09:41:26.730" v="809" actId="47"/>
-        <pc:sldMkLst>
-          <pc:docMk/>
-          <pc:sldMk cId="103028036" sldId="265"/>
-        </pc:sldMkLst>
-        <pc:spChg chg="mod">
-          <ac:chgData name="Ashutosh Singh" userId="8637def5911afb84" providerId="LiveId" clId="{F2D13D7F-537D-4C2C-80A4-C8E242151511}" dt="2024-05-04T09:08:36.719" v="317" actId="20577"/>
-          <ac:spMkLst>
-            <pc:docMk/>
-            <pc:sldMk cId="103028036" sldId="265"/>
-            <ac:spMk id="3" creationId="{3DFCC000-BD5F-EDD9-5A62-5D69546F7A16}"/>
-          </ac:spMkLst>
-        </pc:spChg>
-      </pc:sldChg>
-      <pc:sldChg chg="addSp modSp add mod">
-        <pc:chgData name="Ashutosh Singh" userId="8637def5911afb84" providerId="LiveId" clId="{F2D13D7F-537D-4C2C-80A4-C8E242151511}" dt="2024-05-04T10:14:16.385" v="1288" actId="20577"/>
-        <pc:sldMkLst>
-          <pc:docMk/>
-          <pc:sldMk cId="1268558475" sldId="265"/>
-        </pc:sldMkLst>
-        <pc:spChg chg="mod">
-          <ac:chgData name="Ashutosh Singh" userId="8637def5911afb84" providerId="LiveId" clId="{F2D13D7F-537D-4C2C-80A4-C8E242151511}" dt="2024-05-04T10:13:34.811" v="1242" actId="20577"/>
-          <ac:spMkLst>
-            <pc:docMk/>
-            <pc:sldMk cId="1268558475" sldId="265"/>
-            <ac:spMk id="2" creationId="{28E13C6F-173D-BC5C-2CF9-D2E0F480D826}"/>
-          </ac:spMkLst>
-        </pc:spChg>
-        <pc:graphicFrameChg chg="add mod modGraphic">
-          <ac:chgData name="Ashutosh Singh" userId="8637def5911afb84" providerId="LiveId" clId="{F2D13D7F-537D-4C2C-80A4-C8E242151511}" dt="2024-05-04T10:14:16.385" v="1288" actId="20577"/>
-          <ac:graphicFrameMkLst>
-            <pc:docMk/>
-            <pc:sldMk cId="1268558475" sldId="265"/>
-            <ac:graphicFrameMk id="3" creationId="{657ABF12-87FA-8BC8-DF77-A44527CC84BB}"/>
-          </ac:graphicFrameMkLst>
-        </pc:graphicFrameChg>
-      </pc:sldChg>
-      <pc:sldChg chg="addSp delSp modSp new mod">
-        <pc:chgData name="Ashutosh Singh" userId="8637def5911afb84" providerId="LiveId" clId="{F2D13D7F-537D-4C2C-80A4-C8E242151511}" dt="2024-05-04T10:24:26.856" v="1401" actId="20577"/>
-        <pc:sldMkLst>
-          <pc:docMk/>
-          <pc:sldMk cId="2987620234" sldId="266"/>
-        </pc:sldMkLst>
-        <pc:spChg chg="del">
-          <ac:chgData name="Ashutosh Singh" userId="8637def5911afb84" providerId="LiveId" clId="{F2D13D7F-537D-4C2C-80A4-C8E242151511}" dt="2024-05-04T10:20:07.929" v="1303" actId="478"/>
-          <ac:spMkLst>
-            <pc:docMk/>
-            <pc:sldMk cId="2987620234" sldId="266"/>
-            <ac:spMk id="2" creationId="{42D8E1CB-3F1B-1A12-DF15-2FB5B856B4A0}"/>
-          </ac:spMkLst>
-        </pc:spChg>
-        <pc:spChg chg="del">
-          <ac:chgData name="Ashutosh Singh" userId="8637def5911afb84" providerId="LiveId" clId="{F2D13D7F-537D-4C2C-80A4-C8E242151511}" dt="2024-05-04T10:20:07.929" v="1303" actId="478"/>
-          <ac:spMkLst>
-            <pc:docMk/>
-            <pc:sldMk cId="2987620234" sldId="266"/>
-            <ac:spMk id="3" creationId="{A645C239-8145-9822-AFB2-A74617952A37}"/>
-          </ac:spMkLst>
-        </pc:spChg>
-        <pc:spChg chg="add mod">
-          <ac:chgData name="Ashutosh Singh" userId="8637def5911afb84" providerId="LiveId" clId="{F2D13D7F-537D-4C2C-80A4-C8E242151511}" dt="2024-05-04T10:24:26.856" v="1401" actId="20577"/>
-          <ac:spMkLst>
-            <pc:docMk/>
-            <pc:sldMk cId="2987620234" sldId="266"/>
-            <ac:spMk id="4" creationId="{095E4420-563C-BE8C-79BA-9E65D524C61A}"/>
-          </ac:spMkLst>
-        </pc:spChg>
-      </pc:sldChg>
-      <pc:sldChg chg="addSp delSp add mod">
-        <pc:chgData name="Ashutosh Singh" userId="8637def5911afb84" providerId="LiveId" clId="{F2D13D7F-537D-4C2C-80A4-C8E242151511}" dt="2024-05-04T10:22:11.900" v="1317" actId="22"/>
-        <pc:sldMkLst>
-          <pc:docMk/>
-          <pc:sldMk cId="4276924105" sldId="267"/>
-        </pc:sldMkLst>
-        <pc:spChg chg="add">
-          <ac:chgData name="Ashutosh Singh" userId="8637def5911afb84" providerId="LiveId" clId="{F2D13D7F-537D-4C2C-80A4-C8E242151511}" dt="2024-05-04T10:22:11.900" v="1317" actId="22"/>
-          <ac:spMkLst>
-            <pc:docMk/>
-            <pc:sldMk cId="4276924105" sldId="267"/>
-            <ac:spMk id="3" creationId="{943C0E65-996D-E06B-CF55-7820DDF7FB6F}"/>
-          </ac:spMkLst>
-        </pc:spChg>
-        <pc:spChg chg="del">
-          <ac:chgData name="Ashutosh Singh" userId="8637def5911afb84" providerId="LiveId" clId="{F2D13D7F-537D-4C2C-80A4-C8E242151511}" dt="2024-05-04T10:21:55.415" v="1311" actId="478"/>
-          <ac:spMkLst>
-            <pc:docMk/>
-            <pc:sldMk cId="4276924105" sldId="267"/>
-            <ac:spMk id="5" creationId="{C47514DF-9E50-69B9-C042-F0AB834F2E00}"/>
-          </ac:spMkLst>
-        </pc:spChg>
-      </pc:sldChg>
-      <pc:sldChg chg="add del">
-        <pc:chgData name="Ashutosh Singh" userId="8637def5911afb84" providerId="LiveId" clId="{F2D13D7F-537D-4C2C-80A4-C8E242151511}" dt="2024-05-04T10:22:04.146" v="1316" actId="47"/>
-        <pc:sldMkLst>
-          <pc:docMk/>
-          <pc:sldMk cId="3883680967" sldId="268"/>
-        </pc:sldMkLst>
-      </pc:sldChg>
-      <pc:sldChg chg="delSp add del mod">
-        <pc:chgData name="Ashutosh Singh" userId="8637def5911afb84" providerId="LiveId" clId="{F2D13D7F-537D-4C2C-80A4-C8E242151511}" dt="2024-05-04T10:22:03.754" v="1315" actId="47"/>
-        <pc:sldMkLst>
-          <pc:docMk/>
-          <pc:sldMk cId="2341843684" sldId="269"/>
-        </pc:sldMkLst>
-        <pc:spChg chg="del">
-          <ac:chgData name="Ashutosh Singh" userId="8637def5911afb84" providerId="LiveId" clId="{F2D13D7F-537D-4C2C-80A4-C8E242151511}" dt="2024-05-04T10:22:01.577" v="1314" actId="478"/>
-          <ac:spMkLst>
-            <pc:docMk/>
-            <pc:sldMk cId="2341843684" sldId="269"/>
-            <ac:spMk id="5" creationId="{C47514DF-9E50-69B9-C042-F0AB834F2E00}"/>
-          </ac:spMkLst>
-        </pc:spChg>
-      </pc:sldChg>
-    </pc:docChg>
-  </pc:docChgLst>
-</pc:chgInfo>
-</file>
-
 <file path=ppt/slideLayouts/slideLayout1.xml><?xml version="1.0" encoding="utf-8"?>
 <p:sldLayout xmlns:a="http://schemas.openxmlformats.org/drawingml/2006/main" xmlns:r="http://schemas.openxmlformats.org/officeDocument/2006/relationships" xmlns:p="http://schemas.openxmlformats.org/presentationml/2006/main" type="title" preserve="1">
   <p:cSld name="Title Slide">
@@ -965,7 +277,7 @@
           <a:p>
             <a:fld id="{7687DAAA-09A0-4418-B8F5-9C0B3864F6F2}" type="datetimeFigureOut">
               <a:rPr lang="en-IN" smtClean="0"/>
-              <a:t>04-05-2024</a:t>
+              <a:t>05-05-2024</a:t>
             </a:fld>
             <a:endParaRPr lang="en-IN"/>
           </a:p>
@@ -1165,7 +477,7 @@
           <a:p>
             <a:fld id="{7687DAAA-09A0-4418-B8F5-9C0B3864F6F2}" type="datetimeFigureOut">
               <a:rPr lang="en-IN" smtClean="0"/>
-              <a:t>04-05-2024</a:t>
+              <a:t>05-05-2024</a:t>
             </a:fld>
             <a:endParaRPr lang="en-IN"/>
           </a:p>
@@ -1375,7 +687,7 @@
           <a:p>
             <a:fld id="{7687DAAA-09A0-4418-B8F5-9C0B3864F6F2}" type="datetimeFigureOut">
               <a:rPr lang="en-IN" smtClean="0"/>
-              <a:t>04-05-2024</a:t>
+              <a:t>05-05-2024</a:t>
             </a:fld>
             <a:endParaRPr lang="en-IN"/>
           </a:p>
@@ -1575,7 +887,7 @@
           <a:p>
             <a:fld id="{7687DAAA-09A0-4418-B8F5-9C0B3864F6F2}" type="datetimeFigureOut">
               <a:rPr lang="en-IN" smtClean="0"/>
-              <a:t>04-05-2024</a:t>
+              <a:t>05-05-2024</a:t>
             </a:fld>
             <a:endParaRPr lang="en-IN"/>
           </a:p>
@@ -1851,7 +1163,7 @@
           <a:p>
             <a:fld id="{7687DAAA-09A0-4418-B8F5-9C0B3864F6F2}" type="datetimeFigureOut">
               <a:rPr lang="en-IN" smtClean="0"/>
-              <a:t>04-05-2024</a:t>
+              <a:t>05-05-2024</a:t>
             </a:fld>
             <a:endParaRPr lang="en-IN"/>
           </a:p>
@@ -2119,7 +1431,7 @@
           <a:p>
             <a:fld id="{7687DAAA-09A0-4418-B8F5-9C0B3864F6F2}" type="datetimeFigureOut">
               <a:rPr lang="en-IN" smtClean="0"/>
-              <a:t>04-05-2024</a:t>
+              <a:t>05-05-2024</a:t>
             </a:fld>
             <a:endParaRPr lang="en-IN"/>
           </a:p>
@@ -2534,7 +1846,7 @@
           <a:p>
             <a:fld id="{7687DAAA-09A0-4418-B8F5-9C0B3864F6F2}" type="datetimeFigureOut">
               <a:rPr lang="en-IN" smtClean="0"/>
-              <a:t>04-05-2024</a:t>
+              <a:t>05-05-2024</a:t>
             </a:fld>
             <a:endParaRPr lang="en-IN"/>
           </a:p>
@@ -2676,7 +1988,7 @@
           <a:p>
             <a:fld id="{7687DAAA-09A0-4418-B8F5-9C0B3864F6F2}" type="datetimeFigureOut">
               <a:rPr lang="en-IN" smtClean="0"/>
-              <a:t>04-05-2024</a:t>
+              <a:t>05-05-2024</a:t>
             </a:fld>
             <a:endParaRPr lang="en-IN"/>
           </a:p>
@@ -2789,7 +2101,7 @@
           <a:p>
             <a:fld id="{7687DAAA-09A0-4418-B8F5-9C0B3864F6F2}" type="datetimeFigureOut">
               <a:rPr lang="en-IN" smtClean="0"/>
-              <a:t>04-05-2024</a:t>
+              <a:t>05-05-2024</a:t>
             </a:fld>
             <a:endParaRPr lang="en-IN"/>
           </a:p>
@@ -3102,7 +2414,7 @@
           <a:p>
             <a:fld id="{7687DAAA-09A0-4418-B8F5-9C0B3864F6F2}" type="datetimeFigureOut">
               <a:rPr lang="en-IN" smtClean="0"/>
-              <a:t>04-05-2024</a:t>
+              <a:t>05-05-2024</a:t>
             </a:fld>
             <a:endParaRPr lang="en-IN"/>
           </a:p>
@@ -3391,7 +2703,7 @@
           <a:p>
             <a:fld id="{7687DAAA-09A0-4418-B8F5-9C0B3864F6F2}" type="datetimeFigureOut">
               <a:rPr lang="en-IN" smtClean="0"/>
-              <a:t>04-05-2024</a:t>
+              <a:t>05-05-2024</a:t>
             </a:fld>
             <a:endParaRPr lang="en-IN"/>
           </a:p>
@@ -3634,7 +2946,7 @@
           <a:p>
             <a:fld id="{7687DAAA-09A0-4418-B8F5-9C0B3864F6F2}" type="datetimeFigureOut">
               <a:rPr lang="en-IN" smtClean="0"/>
-              <a:t>04-05-2024</a:t>
+              <a:t>05-05-2024</a:t>
             </a:fld>
             <a:endParaRPr lang="en-IN"/>
           </a:p>
@@ -4959,7 +4271,7 @@
             </a:r>
             <a:r>
               <a:rPr lang="en-IN" sz="1600" dirty="0"/>
-              <a:t>– Multi-speaker Text2Speecf pre-trained model by Nvidia (</a:t>
+              <a:t>– Multi-speaker Text2Speech pre-trained model by Nvidia (</a:t>
             </a:r>
             <a:r>
               <a:rPr lang="en-IN" sz="1600" dirty="0">
@@ -5616,7 +4928,7 @@
         <p:spPr>
           <a:xfrm>
             <a:off x="738606" y="1513344"/>
-            <a:ext cx="6581391" cy="2308324"/>
+            <a:ext cx="11016619" cy="5509200"/>
           </a:xfrm>
           <a:prstGeom prst="rect">
             <a:avLst/>
@@ -5630,45 +4942,393 @@
           <a:lstStyle/>
           <a:p>
             <a:r>
+              <a:rPr lang="en-IN" sz="1600" b="1" dirty="0"/>
+              <a:t>Normalize Text:</a:t>
+            </a:r>
+          </a:p>
+          <a:p>
+            <a:pPr marL="742950" lvl="1" indent="-285750">
+              <a:buFont typeface="Arial" panose="020B0604020202020204" pitchFamily="34" charset="0"/>
+              <a:buChar char="•"/>
+            </a:pPr>
+            <a:r>
               <a:rPr lang="en-IN" sz="1600" dirty="0"/>
-              <a:t>Spectrograms </a:t>
-            </a:r>
-          </a:p>
-          <a:p>
+              <a:t>Use Nvidia’s </a:t>
+            </a:r>
+            <a:r>
+              <a:rPr lang="en-IN" sz="1600" b="0" dirty="0" err="1">
+                <a:solidFill>
+                  <a:srgbClr val="CCCCCC"/>
+                </a:solidFill>
+                <a:effectLst/>
+                <a:highlight>
+                  <a:srgbClr val="1F1F1F"/>
+                </a:highlight>
+                <a:latin typeface="Consolas" panose="020B0609020204030204" pitchFamily="49" charset="0"/>
+              </a:rPr>
+              <a:t>nemo_text_processing.text_normalization.normalize</a:t>
+            </a:r>
+            <a:r>
+              <a:rPr lang="en-IN" sz="1600" dirty="0"/>
+              <a:t> to convert symbols ad digit character to alphabetic words.</a:t>
+            </a:r>
+          </a:p>
+          <a:p>
+            <a:pPr lvl="3"/>
+            <a:r>
+              <a:rPr lang="en-US" sz="1600" b="0" dirty="0">
+                <a:solidFill>
+                  <a:srgbClr val="9CDCFE"/>
+                </a:solidFill>
+                <a:effectLst/>
+                <a:highlight>
+                  <a:srgbClr val="1F1F1F"/>
+                </a:highlight>
+                <a:latin typeface="Consolas" panose="020B0609020204030204" pitchFamily="49" charset="0"/>
+              </a:rPr>
+              <a:t>text</a:t>
+            </a:r>
+            <a:r>
+              <a:rPr lang="en-US" sz="1600" b="0" dirty="0">
+                <a:solidFill>
+                  <a:srgbClr val="CCCCCC"/>
+                </a:solidFill>
+                <a:effectLst/>
+                <a:highlight>
+                  <a:srgbClr val="1F1F1F"/>
+                </a:highlight>
+                <a:latin typeface="Consolas" panose="020B0609020204030204" pitchFamily="49" charset="0"/>
+              </a:rPr>
+              <a:t> </a:t>
+            </a:r>
+            <a:r>
+              <a:rPr lang="en-US" sz="1600" b="0" dirty="0">
+                <a:solidFill>
+                  <a:srgbClr val="D4D4D4"/>
+                </a:solidFill>
+                <a:effectLst/>
+                <a:highlight>
+                  <a:srgbClr val="1F1F1F"/>
+                </a:highlight>
+                <a:latin typeface="Consolas" panose="020B0609020204030204" pitchFamily="49" charset="0"/>
+              </a:rPr>
+              <a:t>=</a:t>
+            </a:r>
+            <a:r>
+              <a:rPr lang="en-US" sz="1600" b="0" dirty="0">
+                <a:solidFill>
+                  <a:srgbClr val="CCCCCC"/>
+                </a:solidFill>
+                <a:effectLst/>
+                <a:highlight>
+                  <a:srgbClr val="1F1F1F"/>
+                </a:highlight>
+                <a:latin typeface="Consolas" panose="020B0609020204030204" pitchFamily="49" charset="0"/>
+              </a:rPr>
+              <a:t> </a:t>
+            </a:r>
+            <a:r>
+              <a:rPr lang="en-US" sz="1600" b="0" dirty="0">
+                <a:solidFill>
+                  <a:srgbClr val="CE9178"/>
+                </a:solidFill>
+                <a:effectLst/>
+                <a:highlight>
+                  <a:srgbClr val="1F1F1F"/>
+                </a:highlight>
+                <a:latin typeface="Consolas" panose="020B0609020204030204" pitchFamily="49" charset="0"/>
+              </a:rPr>
+              <a:t>"Mr. Johnson is turning 35 years old on 04-15-2023."</a:t>
+            </a:r>
+            <a:endParaRPr lang="en-US" sz="1600" b="0" dirty="0">
+              <a:solidFill>
+                <a:srgbClr val="CCCCCC"/>
+              </a:solidFill>
+              <a:effectLst/>
+              <a:highlight>
+                <a:srgbClr val="1F1F1F"/>
+              </a:highlight>
+              <a:latin typeface="Consolas" panose="020B0609020204030204" pitchFamily="49" charset="0"/>
+            </a:endParaRPr>
+          </a:p>
+          <a:p>
+            <a:pPr lvl="3"/>
+            <a:r>
+              <a:rPr lang="en-US" sz="1600" b="0" dirty="0" err="1">
+                <a:solidFill>
+                  <a:srgbClr val="9CDCFE"/>
+                </a:solidFill>
+                <a:effectLst/>
+                <a:highlight>
+                  <a:srgbClr val="1F1F1F"/>
+                </a:highlight>
+                <a:latin typeface="Consolas" panose="020B0609020204030204" pitchFamily="49" charset="0"/>
+              </a:rPr>
+              <a:t>normalized_text</a:t>
+            </a:r>
+            <a:r>
+              <a:rPr lang="en-US" sz="1600" b="0" dirty="0">
+                <a:solidFill>
+                  <a:srgbClr val="CCCCCC"/>
+                </a:solidFill>
+                <a:effectLst/>
+                <a:highlight>
+                  <a:srgbClr val="1F1F1F"/>
+                </a:highlight>
+                <a:latin typeface="Consolas" panose="020B0609020204030204" pitchFamily="49" charset="0"/>
+              </a:rPr>
+              <a:t> </a:t>
+            </a:r>
+            <a:r>
+              <a:rPr lang="en-US" sz="1600" b="0" dirty="0">
+                <a:solidFill>
+                  <a:srgbClr val="D4D4D4"/>
+                </a:solidFill>
+                <a:effectLst/>
+                <a:highlight>
+                  <a:srgbClr val="1F1F1F"/>
+                </a:highlight>
+                <a:latin typeface="Consolas" panose="020B0609020204030204" pitchFamily="49" charset="0"/>
+              </a:rPr>
+              <a:t>=</a:t>
+            </a:r>
+            <a:r>
+              <a:rPr lang="en-US" sz="1600" b="0" dirty="0">
+                <a:solidFill>
+                  <a:srgbClr val="CCCCCC"/>
+                </a:solidFill>
+                <a:effectLst/>
+                <a:highlight>
+                  <a:srgbClr val="1F1F1F"/>
+                </a:highlight>
+                <a:latin typeface="Consolas" panose="020B0609020204030204" pitchFamily="49" charset="0"/>
+              </a:rPr>
+              <a:t> </a:t>
+            </a:r>
+            <a:r>
+              <a:rPr lang="en-US" sz="1600" b="0" dirty="0" err="1">
+                <a:solidFill>
+                  <a:srgbClr val="9CDCFE"/>
+                </a:solidFill>
+                <a:effectLst/>
+                <a:highlight>
+                  <a:srgbClr val="1F1F1F"/>
+                </a:highlight>
+                <a:latin typeface="Consolas" panose="020B0609020204030204" pitchFamily="49" charset="0"/>
+              </a:rPr>
+              <a:t>text_normalizer</a:t>
+            </a:r>
+            <a:r>
+              <a:rPr lang="en-US" sz="1600" b="0" dirty="0" err="1">
+                <a:solidFill>
+                  <a:srgbClr val="CCCCCC"/>
+                </a:solidFill>
+                <a:effectLst/>
+                <a:highlight>
+                  <a:srgbClr val="1F1F1F"/>
+                </a:highlight>
+                <a:latin typeface="Consolas" panose="020B0609020204030204" pitchFamily="49" charset="0"/>
+              </a:rPr>
+              <a:t>.normalize</a:t>
+            </a:r>
+            <a:r>
+              <a:rPr lang="en-US" sz="1600" b="0" dirty="0">
+                <a:solidFill>
+                  <a:srgbClr val="CCCCCC"/>
+                </a:solidFill>
+                <a:effectLst/>
+                <a:highlight>
+                  <a:srgbClr val="1F1F1F"/>
+                </a:highlight>
+                <a:latin typeface="Consolas" panose="020B0609020204030204" pitchFamily="49" charset="0"/>
+              </a:rPr>
+              <a:t>(</a:t>
+            </a:r>
+            <a:r>
+              <a:rPr lang="en-US" sz="1600" b="0" dirty="0">
+                <a:solidFill>
+                  <a:srgbClr val="9CDCFE"/>
+                </a:solidFill>
+                <a:effectLst/>
+                <a:highlight>
+                  <a:srgbClr val="1F1F1F"/>
+                </a:highlight>
+                <a:latin typeface="Consolas" panose="020B0609020204030204" pitchFamily="49" charset="0"/>
+              </a:rPr>
+              <a:t>text</a:t>
+            </a:r>
+            <a:r>
+              <a:rPr lang="en-US" sz="1600" b="0" dirty="0">
+                <a:solidFill>
+                  <a:srgbClr val="CCCCCC"/>
+                </a:solidFill>
+                <a:effectLst/>
+                <a:highlight>
+                  <a:srgbClr val="1F1F1F"/>
+                </a:highlight>
+                <a:latin typeface="Consolas" panose="020B0609020204030204" pitchFamily="49" charset="0"/>
+              </a:rPr>
+              <a:t>)</a:t>
+            </a:r>
+          </a:p>
+          <a:p>
+            <a:pPr lvl="3"/>
+            <a:r>
+              <a:rPr lang="en-US" sz="1600" dirty="0">
+                <a:solidFill>
+                  <a:srgbClr val="CCCCCC"/>
+                </a:solidFill>
+                <a:highlight>
+                  <a:srgbClr val="1F1F1F"/>
+                </a:highlight>
+                <a:latin typeface="Consolas" panose="020B0609020204030204" pitchFamily="49" charset="0"/>
+              </a:rPr>
+              <a:t>Text becomes -&gt; mister Johnson is turning thirty five years old on fifteenth April two thousand and twenty three.</a:t>
+            </a:r>
+            <a:endParaRPr lang="en-US" sz="1600" b="0" dirty="0">
+              <a:solidFill>
+                <a:srgbClr val="CCCCCC"/>
+              </a:solidFill>
+              <a:effectLst/>
+              <a:highlight>
+                <a:srgbClr val="1F1F1F"/>
+              </a:highlight>
+              <a:latin typeface="Consolas" panose="020B0609020204030204" pitchFamily="49" charset="0"/>
+            </a:endParaRPr>
+          </a:p>
+          <a:p>
+            <a:pPr marL="742950" lvl="1" indent="-285750">
+              <a:buFont typeface="Arial" panose="020B0604020202020204" pitchFamily="34" charset="0"/>
+              <a:buChar char="•"/>
+            </a:pPr>
             <a:endParaRPr lang="en-IN" sz="1600" dirty="0"/>
           </a:p>
           <a:p>
             <a:r>
+              <a:rPr lang="en-IN" sz="1600" b="1" dirty="0"/>
+              <a:t>Convert to Audio:</a:t>
+            </a:r>
+          </a:p>
+          <a:p>
+            <a:pPr marL="742950" lvl="1" indent="-285750">
+              <a:buFont typeface="Arial" panose="020B0604020202020204" pitchFamily="34" charset="0"/>
+              <a:buChar char="•"/>
+            </a:pPr>
+            <a:r>
               <a:rPr lang="en-IN" sz="1600" dirty="0"/>
-              <a:t>&lt;Add sample spectrogram from the notebooks here&gt;</a:t>
+              <a:t>Fetch text sentence</a:t>
+            </a:r>
+          </a:p>
+          <a:p>
+            <a:pPr marL="742950" lvl="1" indent="-285750">
+              <a:buFont typeface="Arial" panose="020B0604020202020204" pitchFamily="34" charset="0"/>
+              <a:buChar char="•"/>
+            </a:pPr>
+            <a:r>
+              <a:rPr lang="en-IN" sz="1600" dirty="0"/>
+              <a:t>Convert to a spectrogram using Pre-trained NVIDIA Nemo </a:t>
+            </a:r>
+            <a:r>
+              <a:rPr lang="en-IN" sz="1600" dirty="0" err="1"/>
+              <a:t>FastPitchModel</a:t>
+            </a:r>
+            <a:r>
+              <a:rPr lang="en-IN" sz="1600" dirty="0"/>
+              <a:t> . This model supports 20 pre-trained speaker IDs, including male and female voices.</a:t>
+            </a:r>
+          </a:p>
+          <a:p>
+            <a:pPr marL="742950" lvl="1" indent="-285750">
+              <a:buFont typeface="Arial" panose="020B0604020202020204" pitchFamily="34" charset="0"/>
+              <a:buChar char="•"/>
+            </a:pPr>
+            <a:r>
+              <a:rPr lang="en-IN" sz="1600" dirty="0"/>
+              <a:t>Randomly assign speaker between 1-20 for conversion</a:t>
+            </a:r>
+          </a:p>
+          <a:p>
+            <a:pPr marL="1200150" lvl="2" indent="-285750">
+              <a:buFont typeface="Arial" panose="020B0604020202020204" pitchFamily="34" charset="0"/>
+              <a:buChar char="•"/>
+            </a:pPr>
+            <a:r>
+              <a:rPr lang="en-IN" sz="1600" dirty="0"/>
+              <a:t>Speakers 19, 20 go to validation directory directly (to mimic unseen speakers)</a:t>
+            </a:r>
+          </a:p>
+          <a:p>
+            <a:pPr marL="1200150" lvl="2" indent="-285750">
+              <a:buFont typeface="Arial" panose="020B0604020202020204" pitchFamily="34" charset="0"/>
+              <a:buChar char="•"/>
+            </a:pPr>
+            <a:r>
+              <a:rPr lang="en-IN" sz="1600" dirty="0"/>
+              <a:t>Once every 6 samples otherwise go to validation directory (to mimic unseen text)</a:t>
+            </a:r>
+          </a:p>
+          <a:p>
+            <a:pPr marL="1200150" lvl="2" indent="-285750">
+              <a:buFont typeface="Arial" panose="020B0604020202020204" pitchFamily="34" charset="0"/>
+              <a:buChar char="•"/>
+            </a:pPr>
+            <a:r>
+              <a:rPr lang="en-IN" sz="1600" dirty="0"/>
+              <a:t>All other go to training directory (this crates roughly 80:20 split between training and text data)</a:t>
+            </a:r>
+          </a:p>
+          <a:p>
+            <a:pPr marL="742950" lvl="1" indent="-285750">
+              <a:buFont typeface="Arial" panose="020B0604020202020204" pitchFamily="34" charset="0"/>
+              <a:buChar char="•"/>
+            </a:pPr>
+            <a:r>
+              <a:rPr lang="en-IN" sz="1600" dirty="0"/>
+              <a:t>Convert to audio WAV file </a:t>
+            </a:r>
+          </a:p>
+          <a:p>
+            <a:pPr marL="1200150" lvl="2" indent="-285750">
+              <a:buFont typeface="Arial" panose="020B0604020202020204" pitchFamily="34" charset="0"/>
+              <a:buChar char="•"/>
+            </a:pPr>
+            <a:r>
+              <a:rPr lang="en-IN" sz="1600" dirty="0"/>
+              <a:t>Code PCM S16  LE</a:t>
+            </a:r>
+          </a:p>
+          <a:p>
+            <a:pPr marL="1200150" lvl="2" indent="-285750">
+              <a:buFont typeface="Arial" panose="020B0604020202020204" pitchFamily="34" charset="0"/>
+              <a:buChar char="•"/>
+            </a:pPr>
+            <a:r>
+              <a:rPr lang="en-IN" sz="1600" dirty="0"/>
+              <a:t>Channels: 1 – Mono</a:t>
+            </a:r>
+          </a:p>
+          <a:p>
+            <a:pPr marL="1200150" lvl="2" indent="-285750">
+              <a:buFont typeface="Arial" panose="020B0604020202020204" pitchFamily="34" charset="0"/>
+              <a:buChar char="•"/>
+            </a:pPr>
+            <a:r>
+              <a:rPr lang="en-IN" sz="1600" dirty="0"/>
+              <a:t>Sample Rate: 16000 Hz</a:t>
+            </a:r>
+          </a:p>
+          <a:p>
+            <a:pPr marL="1200150" lvl="2" indent="-285750">
+              <a:buFont typeface="Arial" panose="020B0604020202020204" pitchFamily="34" charset="0"/>
+              <a:buChar char="•"/>
+            </a:pPr>
+            <a:r>
+              <a:rPr lang="en-IN" sz="1600" dirty="0"/>
+              <a:t>Bits per sample:16</a:t>
             </a:r>
           </a:p>
           <a:p>
             <a:endParaRPr lang="en-IN" sz="1600" dirty="0"/>
-          </a:p>
-          <a:p>
-            <a:r>
-              <a:rPr lang="en-IN" sz="1600" dirty="0"/>
-              <a:t>MFCCs</a:t>
-            </a:r>
-          </a:p>
-          <a:p>
-            <a:endParaRPr lang="en-IN" sz="1600" dirty="0"/>
-          </a:p>
-          <a:p>
-            <a:r>
-              <a:rPr lang="en-IN" sz="1600" dirty="0"/>
-              <a:t>&lt;Add sample MFCC from the notebooks here&gt;</a:t>
-            </a:r>
-          </a:p>
-          <a:p>
-            <a:endParaRPr lang="en-IN" sz="1600" dirty="0"/>
-          </a:p>
-          <a:p>
-            <a:r>
-              <a:rPr lang="en-IN" sz="1600" dirty="0"/>
-              <a:t>&lt;Add other details like hyper-params here&gt;</a:t>
-            </a:r>
           </a:p>
         </p:txBody>
       </p:sp>
@@ -5732,97 +5392,269 @@
           <a:p>
             <a:pPr algn="l"/>
             <a:r>
-              <a:rPr lang="en-US" sz="2800" b="1" i="0" dirty="0">
+              <a:rPr lang="en-US" sz="2800" b="1" dirty="0">
                 <a:solidFill>
                   <a:srgbClr val="222222"/>
                 </a:solidFill>
-                <a:effectLst/>
                 <a:highlight>
                   <a:srgbClr val="FFFFFF"/>
                 </a:highlight>
                 <a:latin typeface="Arial" panose="020B0604020202020204" pitchFamily="34" charset="0"/>
               </a:rPr>
-              <a:t>ASR Training</a:t>
+              <a:t>Data Pre-processing - ASR</a:t>
+            </a:r>
+            <a:endParaRPr lang="en-US" sz="2800" b="1" i="0" dirty="0">
+              <a:solidFill>
+                <a:srgbClr val="222222"/>
+              </a:solidFill>
+              <a:effectLst/>
+              <a:highlight>
+                <a:srgbClr val="FFFFFF"/>
+              </a:highlight>
+              <a:latin typeface="Arial" panose="020B0604020202020204" pitchFamily="34" charset="0"/>
+            </a:endParaRPr>
+          </a:p>
+        </p:txBody>
+      </p:sp>
+      <p:sp>
+        <p:nvSpPr>
+          <p:cNvPr id="3" name="TextBox 2">
+            <a:extLst>
+              <a:ext uri="{FF2B5EF4-FFF2-40B4-BE49-F238E27FC236}">
+                <a16:creationId xmlns:a16="http://schemas.microsoft.com/office/drawing/2014/main" id="{53EAE4CA-504C-8CB4-22B7-7CFAEB4EE190}"/>
+              </a:ext>
+            </a:extLst>
+          </p:cNvPr>
+          <p:cNvSpPr txBox="1"/>
+          <p:nvPr/>
+        </p:nvSpPr>
+        <p:spPr>
+          <a:xfrm>
+            <a:off x="612742" y="1225179"/>
+            <a:ext cx="11133425" cy="4770537"/>
+          </a:xfrm>
+          <a:prstGeom prst="rect">
+            <a:avLst/>
+          </a:prstGeom>
+          <a:noFill/>
+        </p:spPr>
+        <p:txBody>
+          <a:bodyPr wrap="square" rtlCol="0">
+            <a:spAutoFit/>
+          </a:bodyPr>
+          <a:lstStyle/>
+          <a:p>
+            <a:r>
+              <a:rPr lang="en-IN" sz="1600" b="1" dirty="0"/>
+              <a:t>Create Text Corpuses:</a:t>
+            </a:r>
+          </a:p>
+          <a:p>
+            <a:pPr marL="285750" indent="-285750">
+              <a:buFont typeface="Arial" panose="020B0604020202020204" pitchFamily="34" charset="0"/>
+              <a:buChar char="•"/>
+            </a:pPr>
+            <a:r>
+              <a:rPr lang="en-IN" sz="1600" dirty="0"/>
+              <a:t>Creates a training corpus and validation corpus from last section</a:t>
+            </a:r>
+          </a:p>
+          <a:p>
+            <a:pPr marL="285750" indent="-285750">
+              <a:buFont typeface="Arial" panose="020B0604020202020204" pitchFamily="34" charset="0"/>
+              <a:buChar char="•"/>
+            </a:pPr>
+            <a:r>
+              <a:rPr lang="en-IN" sz="1600" dirty="0"/>
+              <a:t>Each line in corpus contains ID for a sentence, WAV file path, duration of the Audio and text</a:t>
+            </a:r>
+          </a:p>
+          <a:p>
+            <a:endParaRPr lang="en-IN" sz="1600" dirty="0"/>
+          </a:p>
+          <a:p>
+            <a:r>
+              <a:rPr lang="en-IN" sz="1600" dirty="0"/>
+              <a:t>Raw Audio: </a:t>
+            </a:r>
+            <a:r>
+              <a:rPr lang="en-US" sz="1600" dirty="0"/>
+              <a:t>it was a privilege to work for him.</a:t>
+            </a:r>
+            <a:endParaRPr lang="en-IN" sz="1600" dirty="0"/>
+          </a:p>
+          <a:p>
+            <a:endParaRPr lang="en-IN" sz="1600" dirty="0"/>
+          </a:p>
+          <a:p>
+            <a:endParaRPr lang="en-IN" sz="1600" dirty="0"/>
+          </a:p>
+          <a:p>
+            <a:endParaRPr lang="en-IN" sz="1600" dirty="0"/>
+          </a:p>
+          <a:p>
+            <a:endParaRPr lang="en-IN" sz="1600" dirty="0"/>
+          </a:p>
+          <a:p>
+            <a:endParaRPr lang="en-IN" sz="1600" dirty="0"/>
+          </a:p>
+          <a:p>
+            <a:endParaRPr lang="en-IN" sz="1600" dirty="0"/>
+          </a:p>
+          <a:p>
+            <a:endParaRPr lang="en-IN" sz="1600" dirty="0"/>
+          </a:p>
+          <a:p>
+            <a:r>
+              <a:rPr lang="en-IN" sz="1600" dirty="0"/>
+              <a:t>Spectrograms </a:t>
+            </a:r>
+          </a:p>
+          <a:p>
+            <a:endParaRPr lang="en-IN" sz="1600" dirty="0"/>
+          </a:p>
+          <a:p>
+            <a:r>
+              <a:rPr lang="en-IN" sz="1600" dirty="0"/>
+              <a:t>Sample Diagram of Spectrogram 200 </a:t>
+            </a:r>
+            <a:r>
+              <a:rPr lang="en-IN" sz="1600" dirty="0" err="1"/>
+              <a:t>ms</a:t>
+            </a:r>
+            <a:r>
+              <a:rPr lang="en-IN" sz="1600" dirty="0"/>
+              <a:t> with 161 features</a:t>
+            </a:r>
+          </a:p>
+          <a:p>
+            <a:endParaRPr lang="en-IN" sz="1600" dirty="0"/>
+          </a:p>
+          <a:p>
+            <a:r>
+              <a:rPr lang="en-IN" sz="1600" dirty="0"/>
+              <a:t>MFCCs</a:t>
+            </a:r>
+          </a:p>
+          <a:p>
+            <a:endParaRPr lang="en-IN" sz="1600" dirty="0"/>
+          </a:p>
+          <a:p>
+            <a:r>
+              <a:rPr lang="en-IN" sz="1600" dirty="0"/>
+              <a:t>Sample Diagram of Spectrogram 200 </a:t>
+            </a:r>
+            <a:r>
+              <a:rPr lang="en-IN" sz="1600" dirty="0" err="1"/>
+              <a:t>ms</a:t>
+            </a:r>
+            <a:r>
+              <a:rPr lang="en-IN" sz="1600" dirty="0"/>
+              <a:t> with 13 features</a:t>
             </a:r>
           </a:p>
         </p:txBody>
       </p:sp>
       <p:pic>
         <p:nvPicPr>
-          <p:cNvPr id="5" name="Picture 4">
-            <a:extLst>
-              <a:ext uri="{FF2B5EF4-FFF2-40B4-BE49-F238E27FC236}">
-                <a16:creationId xmlns:a16="http://schemas.microsoft.com/office/drawing/2014/main" id="{9B1069C8-12DC-E6BA-A614-1F0D070B35B5}"/>
+          <p:cNvPr id="1026" name="Picture 2">
+            <a:extLst>
+              <a:ext uri="{FF2B5EF4-FFF2-40B4-BE49-F238E27FC236}">
+                <a16:creationId xmlns:a16="http://schemas.microsoft.com/office/drawing/2014/main" id="{FFA062BC-39E1-55A6-D0B4-E6872B0D6F25}"/>
               </a:ext>
             </a:extLst>
           </p:cNvPr>
           <p:cNvPicPr>
-            <a:picLocks noChangeAspect="1"/>
+            <a:picLocks noChangeAspect="1" noChangeArrowheads="1"/>
           </p:cNvPicPr>
           <p:nvPr/>
         </p:nvPicPr>
         <p:blipFill>
-          <a:blip r:embed="rId2"/>
+          <a:blip r:embed="rId2">
+            <a:extLst>
+              <a:ext uri="{28A0092B-C50C-407E-A947-70E740481C1C}">
+                <a14:useLocalDpi xmlns:a14="http://schemas.microsoft.com/office/drawing/2010/main" val="0"/>
+              </a:ext>
+            </a:extLst>
+          </a:blip>
+          <a:srcRect/>
           <a:stretch>
             <a:fillRect/>
           </a:stretch>
         </p:blipFill>
-        <p:spPr>
-          <a:xfrm>
-            <a:off x="241112" y="1307709"/>
-            <a:ext cx="3719443" cy="2121290"/>
+        <p:spPr bwMode="auto">
+          <a:xfrm>
+            <a:off x="780690" y="2651288"/>
+            <a:ext cx="5842205" cy="1555423"/>
           </a:xfrm>
           <a:prstGeom prst="rect">
             <a:avLst/>
           </a:prstGeom>
-          <a:ln w="3175">
-            <a:solidFill>
-              <a:schemeClr val="tx1"/>
-            </a:solidFill>
-          </a:ln>
+          <a:noFill/>
+          <a:extLst>
+            <a:ext uri="{909E8E84-426E-40DD-AFC4-6F175D3DCCD1}">
+              <a14:hiddenFill xmlns:a14="http://schemas.microsoft.com/office/drawing/2010/main">
+                <a:solidFill>
+                  <a:srgbClr val="FFFFFF"/>
+                </a:solidFill>
+              </a14:hiddenFill>
+            </a:ext>
+          </a:extLst>
         </p:spPr>
       </p:pic>
       <p:pic>
         <p:nvPicPr>
-          <p:cNvPr id="7" name="Picture 6">
-            <a:extLst>
-              <a:ext uri="{FF2B5EF4-FFF2-40B4-BE49-F238E27FC236}">
-                <a16:creationId xmlns:a16="http://schemas.microsoft.com/office/drawing/2014/main" id="{05B57275-D449-EAEE-F599-AFE7106C7776}"/>
+          <p:cNvPr id="1028" name="Picture 4">
+            <a:extLst>
+              <a:ext uri="{FF2B5EF4-FFF2-40B4-BE49-F238E27FC236}">
+                <a16:creationId xmlns:a16="http://schemas.microsoft.com/office/drawing/2014/main" id="{A9A58138-39A3-61F5-87C5-D89F9B9F4E8A}"/>
               </a:ext>
             </a:extLst>
           </p:cNvPr>
           <p:cNvPicPr>
-            <a:picLocks noChangeAspect="1"/>
+            <a:picLocks noChangeAspect="1" noChangeArrowheads="1"/>
           </p:cNvPicPr>
           <p:nvPr/>
         </p:nvPicPr>
         <p:blipFill>
-          <a:blip r:embed="rId3"/>
+          <a:blip r:embed="rId3">
+            <a:extLst>
+              <a:ext uri="{28A0092B-C50C-407E-A947-70E740481C1C}">
+                <a14:useLocalDpi xmlns:a14="http://schemas.microsoft.com/office/drawing/2010/main" val="0"/>
+              </a:ext>
+            </a:extLst>
+          </a:blip>
+          <a:srcRect/>
           <a:stretch>
             <a:fillRect/>
           </a:stretch>
         </p:blipFill>
-        <p:spPr>
-          <a:xfrm>
-            <a:off x="4232862" y="1307710"/>
-            <a:ext cx="3593339" cy="2149546"/>
+        <p:spPr bwMode="auto">
+          <a:xfrm>
+            <a:off x="6988404" y="1916792"/>
+            <a:ext cx="4543720" cy="2410762"/>
           </a:xfrm>
           <a:prstGeom prst="rect">
             <a:avLst/>
           </a:prstGeom>
-          <a:ln w="3175">
-            <a:solidFill>
-              <a:schemeClr val="tx1"/>
-            </a:solidFill>
-          </a:ln>
+          <a:noFill/>
+          <a:extLst>
+            <a:ext uri="{909E8E84-426E-40DD-AFC4-6F175D3DCCD1}">
+              <a14:hiddenFill xmlns:a14="http://schemas.microsoft.com/office/drawing/2010/main">
+                <a:solidFill>
+                  <a:srgbClr val="FFFFFF"/>
+                </a:solidFill>
+              </a14:hiddenFill>
+            </a:ext>
+          </a:extLst>
         </p:spPr>
       </p:pic>
       <p:pic>
         <p:nvPicPr>
-          <p:cNvPr id="9" name="Picture 8">
-            <a:extLst>
-              <a:ext uri="{FF2B5EF4-FFF2-40B4-BE49-F238E27FC236}">
-                <a16:creationId xmlns:a16="http://schemas.microsoft.com/office/drawing/2014/main" id="{3652530A-6CD7-284F-91AB-0B398A92B4C4}"/>
+          <p:cNvPr id="4" name="Picture 3">
+            <a:extLst>
+              <a:ext uri="{FF2B5EF4-FFF2-40B4-BE49-F238E27FC236}">
+                <a16:creationId xmlns:a16="http://schemas.microsoft.com/office/drawing/2014/main" id="{8DBCF05C-5991-461E-6C51-4D08D1618E39}"/>
               </a:ext>
             </a:extLst>
           </p:cNvPr>
@@ -5839,409 +5671,18 @@
         </p:blipFill>
         <p:spPr>
           <a:xfrm>
-            <a:off x="8098508" y="1307710"/>
-            <a:ext cx="4004027" cy="2121289"/>
+            <a:off x="7129832" y="4327554"/>
+            <a:ext cx="4402292" cy="2160604"/>
           </a:xfrm>
           <a:prstGeom prst="rect">
             <a:avLst/>
           </a:prstGeom>
-          <a:ln w="3175">
-            <a:solidFill>
-              <a:schemeClr val="tx1"/>
-            </a:solidFill>
-          </a:ln>
         </p:spPr>
       </p:pic>
-      <p:pic>
-        <p:nvPicPr>
-          <p:cNvPr id="12" name="Picture 11">
-            <a:extLst>
-              <a:ext uri="{FF2B5EF4-FFF2-40B4-BE49-F238E27FC236}">
-                <a16:creationId xmlns:a16="http://schemas.microsoft.com/office/drawing/2014/main" id="{09F224FB-C3FC-6C84-25E7-F892E3DC9E73}"/>
-              </a:ext>
-            </a:extLst>
-          </p:cNvPr>
-          <p:cNvPicPr>
-            <a:picLocks noChangeAspect="1"/>
-          </p:cNvPicPr>
-          <p:nvPr/>
-        </p:nvPicPr>
-        <p:blipFill>
-          <a:blip r:embed="rId4"/>
-          <a:stretch>
-            <a:fillRect/>
-          </a:stretch>
-        </p:blipFill>
-        <p:spPr>
-          <a:xfrm>
-            <a:off x="367215" y="4071452"/>
-            <a:ext cx="3593340" cy="1903712"/>
-          </a:xfrm>
-          <a:prstGeom prst="rect">
-            <a:avLst/>
-          </a:prstGeom>
-          <a:ln w="3175">
-            <a:solidFill>
-              <a:schemeClr val="tx1"/>
-            </a:solidFill>
-          </a:ln>
-        </p:spPr>
-      </p:pic>
-      <p:sp>
-        <p:nvSpPr>
-          <p:cNvPr id="14" name="TextBox 13">
-            <a:extLst>
-              <a:ext uri="{FF2B5EF4-FFF2-40B4-BE49-F238E27FC236}">
-                <a16:creationId xmlns:a16="http://schemas.microsoft.com/office/drawing/2014/main" id="{86119567-FA02-4645-D1EB-9A1C99F5E98E}"/>
-              </a:ext>
-            </a:extLst>
-          </p:cNvPr>
-          <p:cNvSpPr txBox="1"/>
-          <p:nvPr/>
-        </p:nvSpPr>
-        <p:spPr>
-          <a:xfrm>
-            <a:off x="1540452" y="3457256"/>
-            <a:ext cx="1265093" cy="369332"/>
-          </a:xfrm>
-          <a:prstGeom prst="rect">
-            <a:avLst/>
-          </a:prstGeom>
-          <a:noFill/>
-        </p:spPr>
-        <p:txBody>
-          <a:bodyPr wrap="square">
-            <a:spAutoFit/>
-          </a:bodyPr>
-          <a:lstStyle/>
-          <a:p>
-            <a:r>
-              <a:rPr lang="en-IN" b="0" dirty="0">
-                <a:effectLst/>
-                <a:highlight>
-                  <a:srgbClr val="F7F7F7"/>
-                </a:highlight>
-                <a:latin typeface="Courier New" panose="02070309020205020404" pitchFamily="49" charset="0"/>
-              </a:rPr>
-              <a:t>RNN</a:t>
-            </a:r>
-          </a:p>
-        </p:txBody>
-      </p:sp>
-      <p:sp>
-        <p:nvSpPr>
-          <p:cNvPr id="15" name="TextBox 14">
-            <a:extLst>
-              <a:ext uri="{FF2B5EF4-FFF2-40B4-BE49-F238E27FC236}">
-                <a16:creationId xmlns:a16="http://schemas.microsoft.com/office/drawing/2014/main" id="{CBB3D580-5AFE-B5A3-65E0-28497D4AC858}"/>
-              </a:ext>
-            </a:extLst>
-          </p:cNvPr>
-          <p:cNvSpPr txBox="1"/>
-          <p:nvPr/>
-        </p:nvSpPr>
-        <p:spPr>
-          <a:xfrm>
-            <a:off x="4510062" y="3464730"/>
-            <a:ext cx="3096084" cy="923330"/>
-          </a:xfrm>
-          <a:prstGeom prst="rect">
-            <a:avLst/>
-          </a:prstGeom>
-          <a:noFill/>
-        </p:spPr>
-        <p:txBody>
-          <a:bodyPr wrap="square">
-            <a:spAutoFit/>
-          </a:bodyPr>
-          <a:lstStyle/>
-          <a:p>
-            <a:pPr algn="ctr"/>
-            <a:r>
-              <a:rPr lang="en-IN" b="0" dirty="0">
-                <a:effectLst/>
-                <a:highlight>
-                  <a:srgbClr val="F7F7F7"/>
-                </a:highlight>
-                <a:latin typeface="Courier New" panose="02070309020205020404" pitchFamily="49" charset="0"/>
-              </a:rPr>
-              <a:t>RNN + </a:t>
-            </a:r>
-            <a:r>
-              <a:rPr lang="en-IN" b="0" dirty="0" err="1">
-                <a:effectLst/>
-                <a:highlight>
-                  <a:srgbClr val="F7F7F7"/>
-                </a:highlight>
-                <a:latin typeface="Courier New" panose="02070309020205020404" pitchFamily="49" charset="0"/>
-              </a:rPr>
-              <a:t>TimeDistributed</a:t>
-            </a:r>
-            <a:r>
-              <a:rPr lang="en-IN" b="0" dirty="0">
-                <a:effectLst/>
-                <a:highlight>
-                  <a:srgbClr val="F7F7F7"/>
-                </a:highlight>
-                <a:latin typeface="Courier New" panose="02070309020205020404" pitchFamily="49" charset="0"/>
-              </a:rPr>
-              <a:t> Dense</a:t>
-            </a:r>
-          </a:p>
-          <a:p>
-            <a:pPr algn="ctr"/>
-            <a:endParaRPr lang="en-IN" b="0" dirty="0">
-              <a:effectLst/>
-              <a:highlight>
-                <a:srgbClr val="F7F7F7"/>
-              </a:highlight>
-              <a:latin typeface="Courier New" panose="02070309020205020404" pitchFamily="49" charset="0"/>
-            </a:endParaRPr>
-          </a:p>
-        </p:txBody>
-      </p:sp>
-      <p:sp>
-        <p:nvSpPr>
-          <p:cNvPr id="17" name="TextBox 16">
-            <a:extLst>
-              <a:ext uri="{FF2B5EF4-FFF2-40B4-BE49-F238E27FC236}">
-                <a16:creationId xmlns:a16="http://schemas.microsoft.com/office/drawing/2014/main" id="{146A84AF-24C4-2F5F-AE78-E7364D472987}"/>
-              </a:ext>
-            </a:extLst>
-          </p:cNvPr>
-          <p:cNvSpPr txBox="1"/>
-          <p:nvPr/>
-        </p:nvSpPr>
-        <p:spPr>
-          <a:xfrm>
-            <a:off x="8623620" y="3425121"/>
-            <a:ext cx="3478915" cy="646331"/>
-          </a:xfrm>
-          <a:prstGeom prst="rect">
-            <a:avLst/>
-          </a:prstGeom>
-          <a:noFill/>
-        </p:spPr>
-        <p:txBody>
-          <a:bodyPr wrap="square">
-            <a:spAutoFit/>
-          </a:bodyPr>
-          <a:lstStyle/>
-          <a:p>
-            <a:pPr algn="ctr"/>
-            <a:r>
-              <a:rPr lang="en-IN" b="0" dirty="0">
-                <a:effectLst/>
-                <a:highlight>
-                  <a:srgbClr val="F7F7F7"/>
-                </a:highlight>
-                <a:latin typeface="Courier New" panose="02070309020205020404" pitchFamily="49" charset="0"/>
-              </a:rPr>
-              <a:t>CNN + RNN + </a:t>
-            </a:r>
-            <a:r>
-              <a:rPr lang="en-IN" b="0" dirty="0" err="1">
-                <a:effectLst/>
-                <a:highlight>
-                  <a:srgbClr val="F7F7F7"/>
-                </a:highlight>
-                <a:latin typeface="Courier New" panose="02070309020205020404" pitchFamily="49" charset="0"/>
-              </a:rPr>
-              <a:t>TimeDistributed</a:t>
-            </a:r>
-            <a:r>
-              <a:rPr lang="en-IN" b="0" dirty="0">
-                <a:effectLst/>
-                <a:highlight>
-                  <a:srgbClr val="F7F7F7"/>
-                </a:highlight>
-                <a:latin typeface="Courier New" panose="02070309020205020404" pitchFamily="49" charset="0"/>
-              </a:rPr>
-              <a:t> Dense</a:t>
-            </a:r>
-          </a:p>
-        </p:txBody>
-      </p:sp>
-      <p:sp>
-        <p:nvSpPr>
-          <p:cNvPr id="20" name="TextBox 19">
-            <a:extLst>
-              <a:ext uri="{FF2B5EF4-FFF2-40B4-BE49-F238E27FC236}">
-                <a16:creationId xmlns:a16="http://schemas.microsoft.com/office/drawing/2014/main" id="{C5CA9786-0D08-0B86-DE26-22CFC5E962FE}"/>
-              </a:ext>
-            </a:extLst>
-          </p:cNvPr>
-          <p:cNvSpPr txBox="1"/>
-          <p:nvPr/>
-        </p:nvSpPr>
-        <p:spPr>
-          <a:xfrm>
-            <a:off x="484645" y="6001467"/>
-            <a:ext cx="3475910" cy="646331"/>
-          </a:xfrm>
-          <a:prstGeom prst="rect">
-            <a:avLst/>
-          </a:prstGeom>
-          <a:noFill/>
-        </p:spPr>
-        <p:txBody>
-          <a:bodyPr wrap="square">
-            <a:spAutoFit/>
-          </a:bodyPr>
-          <a:lstStyle/>
-          <a:p>
-            <a:pPr algn="ctr"/>
-            <a:r>
-              <a:rPr lang="en-IN" b="0" dirty="0">
-                <a:effectLst/>
-                <a:highlight>
-                  <a:srgbClr val="F7F7F7"/>
-                </a:highlight>
-                <a:latin typeface="Courier New" panose="02070309020205020404" pitchFamily="49" charset="0"/>
-              </a:rPr>
-              <a:t>Bidirectional RNN + </a:t>
-            </a:r>
-            <a:r>
-              <a:rPr lang="en-IN" b="0" dirty="0" err="1">
-                <a:effectLst/>
-                <a:highlight>
-                  <a:srgbClr val="F7F7F7"/>
-                </a:highlight>
-                <a:latin typeface="Courier New" panose="02070309020205020404" pitchFamily="49" charset="0"/>
-              </a:rPr>
-              <a:t>TimeDistributed</a:t>
-            </a:r>
-            <a:r>
-              <a:rPr lang="en-IN" b="0" dirty="0">
-                <a:effectLst/>
-                <a:highlight>
-                  <a:srgbClr val="F7F7F7"/>
-                </a:highlight>
-                <a:latin typeface="Courier New" panose="02070309020205020404" pitchFamily="49" charset="0"/>
-              </a:rPr>
-              <a:t> Dense</a:t>
-            </a:r>
-            <a:endParaRPr lang="en-IN" dirty="0"/>
-          </a:p>
-        </p:txBody>
-      </p:sp>
-      <p:pic>
-        <p:nvPicPr>
-          <p:cNvPr id="22" name="Picture 21">
-            <a:extLst>
-              <a:ext uri="{FF2B5EF4-FFF2-40B4-BE49-F238E27FC236}">
-                <a16:creationId xmlns:a16="http://schemas.microsoft.com/office/drawing/2014/main" id="{95A0A70E-D134-B365-2879-B7F5B707AC71}"/>
-              </a:ext>
-            </a:extLst>
-          </p:cNvPr>
-          <p:cNvPicPr>
-            <a:picLocks noChangeAspect="1"/>
-          </p:cNvPicPr>
-          <p:nvPr/>
-        </p:nvPicPr>
-        <p:blipFill>
-          <a:blip r:embed="rId4"/>
-          <a:stretch>
-            <a:fillRect/>
-          </a:stretch>
-        </p:blipFill>
-        <p:spPr>
-          <a:xfrm>
-            <a:off x="4357037" y="4071452"/>
-            <a:ext cx="4004027" cy="2121289"/>
-          </a:xfrm>
-          <a:prstGeom prst="rect">
-            <a:avLst/>
-          </a:prstGeom>
-          <a:ln w="3175">
-            <a:solidFill>
-              <a:schemeClr val="tx1"/>
-            </a:solidFill>
-          </a:ln>
-        </p:spPr>
-      </p:pic>
-      <p:sp>
-        <p:nvSpPr>
-          <p:cNvPr id="23" name="TextBox 22">
-            <a:extLst>
-              <a:ext uri="{FF2B5EF4-FFF2-40B4-BE49-F238E27FC236}">
-                <a16:creationId xmlns:a16="http://schemas.microsoft.com/office/drawing/2014/main" id="{E2CE7243-A7B1-A4AA-4025-CC6F53AEBFF7}"/>
-              </a:ext>
-            </a:extLst>
-          </p:cNvPr>
-          <p:cNvSpPr txBox="1"/>
-          <p:nvPr/>
-        </p:nvSpPr>
-        <p:spPr>
-          <a:xfrm>
-            <a:off x="4185945" y="6188863"/>
-            <a:ext cx="4175119" cy="646331"/>
-          </a:xfrm>
-          <a:prstGeom prst="rect">
-            <a:avLst/>
-          </a:prstGeom>
-          <a:noFill/>
-        </p:spPr>
-        <p:txBody>
-          <a:bodyPr wrap="square">
-            <a:spAutoFit/>
-          </a:bodyPr>
-          <a:lstStyle/>
-          <a:p>
-            <a:pPr algn="ctr"/>
-            <a:r>
-              <a:rPr lang="en-IN" b="0" dirty="0">
-                <a:effectLst/>
-                <a:highlight>
-                  <a:srgbClr val="F7F7F7"/>
-                </a:highlight>
-                <a:latin typeface="Courier New" panose="02070309020205020404" pitchFamily="49" charset="0"/>
-              </a:rPr>
-              <a:t>CNN + RNN + </a:t>
-            </a:r>
-            <a:r>
-              <a:rPr lang="en-IN" b="0" dirty="0" err="1">
-                <a:effectLst/>
-                <a:highlight>
-                  <a:srgbClr val="F7F7F7"/>
-                </a:highlight>
-                <a:latin typeface="Courier New" panose="02070309020205020404" pitchFamily="49" charset="0"/>
-              </a:rPr>
-              <a:t>TimeDistributed</a:t>
-            </a:r>
-            <a:r>
-              <a:rPr lang="en-IN" b="0" dirty="0">
-                <a:effectLst/>
-                <a:highlight>
-                  <a:srgbClr val="F7F7F7"/>
-                </a:highlight>
-                <a:latin typeface="Courier New" panose="02070309020205020404" pitchFamily="49" charset="0"/>
-              </a:rPr>
-              <a:t> Dense</a:t>
-            </a:r>
-            <a:r>
-              <a:rPr lang="en-IN" dirty="0">
-                <a:highlight>
-                  <a:srgbClr val="F7F7F7"/>
-                </a:highlight>
-                <a:latin typeface="Courier New" panose="02070309020205020404" pitchFamily="49" charset="0"/>
-              </a:rPr>
-              <a:t> + Dropout</a:t>
-            </a:r>
-            <a:endParaRPr lang="en-IN" b="0" dirty="0">
-              <a:effectLst/>
-              <a:highlight>
-                <a:srgbClr val="F7F7F7"/>
-              </a:highlight>
-              <a:latin typeface="Courier New" panose="02070309020205020404" pitchFamily="49" charset="0"/>
-            </a:endParaRPr>
-          </a:p>
-        </p:txBody>
-      </p:sp>
     </p:spTree>
     <p:extLst>
       <p:ext uri="{BB962C8B-B14F-4D97-AF65-F5344CB8AC3E}">
-        <p14:creationId xmlns:p14="http://schemas.microsoft.com/office/powerpoint/2010/main" val="1306230644"/>
+        <p14:creationId xmlns:p14="http://schemas.microsoft.com/office/powerpoint/2010/main" val="669947918"/>
       </p:ext>
     </p:extLst>
   </p:cSld>
@@ -6270,10 +5711,10 @@
       </p:grpSpPr>
       <p:sp>
         <p:nvSpPr>
-          <p:cNvPr id="4" name="TextBox 3">
-            <a:extLst>
-              <a:ext uri="{FF2B5EF4-FFF2-40B4-BE49-F238E27FC236}">
-                <a16:creationId xmlns:a16="http://schemas.microsoft.com/office/drawing/2014/main" id="{095E4420-563C-BE8C-79BA-9E65D524C61A}"/>
+          <p:cNvPr id="2" name="TextBox 1">
+            <a:extLst>
+              <a:ext uri="{FF2B5EF4-FFF2-40B4-BE49-F238E27FC236}">
+                <a16:creationId xmlns:a16="http://schemas.microsoft.com/office/drawing/2014/main" id="{28E13C6F-173D-BC5C-2CF9-D2E0F480D826}"/>
               </a:ext>
             </a:extLst>
           </p:cNvPr>
@@ -6282,8 +5723,8 @@
         </p:nvSpPr>
         <p:spPr>
           <a:xfrm>
-            <a:off x="738606" y="1513344"/>
-            <a:ext cx="6581391" cy="338554"/>
+            <a:off x="511276" y="493449"/>
+            <a:ext cx="6607279" cy="523220"/>
           </a:xfrm>
           <a:prstGeom prst="rect">
             <a:avLst/>
@@ -6291,22 +5732,614 @@
           <a:noFill/>
         </p:spPr>
         <p:txBody>
-          <a:bodyPr wrap="square" rtlCol="0">
+          <a:bodyPr wrap="square">
             <a:spAutoFit/>
           </a:bodyPr>
           <a:lstStyle/>
           <a:p>
-            <a:r>
-              <a:rPr lang="en-IN" sz="1600" dirty="0"/>
-              <a:t>Add Training Convergence charts here</a:t>
-            </a:r>
+            <a:pPr algn="l"/>
+            <a:r>
+              <a:rPr lang="en-US" sz="2800" b="1" i="0" dirty="0">
+                <a:solidFill>
+                  <a:srgbClr val="222222"/>
+                </a:solidFill>
+                <a:effectLst/>
+                <a:highlight>
+                  <a:srgbClr val="FFFFFF"/>
+                </a:highlight>
+                <a:latin typeface="Arial" panose="020B0604020202020204" pitchFamily="34" charset="0"/>
+              </a:rPr>
+              <a:t>ASR Training</a:t>
+            </a:r>
+          </a:p>
+        </p:txBody>
+      </p:sp>
+      <p:pic>
+        <p:nvPicPr>
+          <p:cNvPr id="5" name="Picture 4">
+            <a:extLst>
+              <a:ext uri="{FF2B5EF4-FFF2-40B4-BE49-F238E27FC236}">
+                <a16:creationId xmlns:a16="http://schemas.microsoft.com/office/drawing/2014/main" id="{9B1069C8-12DC-E6BA-A614-1F0D070B35B5}"/>
+              </a:ext>
+            </a:extLst>
+          </p:cNvPr>
+          <p:cNvPicPr>
+            <a:picLocks noChangeAspect="1"/>
+          </p:cNvPicPr>
+          <p:nvPr/>
+        </p:nvPicPr>
+        <p:blipFill>
+          <a:blip r:embed="rId2"/>
+          <a:stretch>
+            <a:fillRect/>
+          </a:stretch>
+        </p:blipFill>
+        <p:spPr>
+          <a:xfrm>
+            <a:off x="241112" y="1307709"/>
+            <a:ext cx="3719443" cy="2121290"/>
+          </a:xfrm>
+          <a:prstGeom prst="rect">
+            <a:avLst/>
+          </a:prstGeom>
+          <a:ln w="3175">
+            <a:solidFill>
+              <a:schemeClr val="tx1"/>
+            </a:solidFill>
+          </a:ln>
+        </p:spPr>
+      </p:pic>
+      <p:pic>
+        <p:nvPicPr>
+          <p:cNvPr id="7" name="Picture 6">
+            <a:extLst>
+              <a:ext uri="{FF2B5EF4-FFF2-40B4-BE49-F238E27FC236}">
+                <a16:creationId xmlns:a16="http://schemas.microsoft.com/office/drawing/2014/main" id="{05B57275-D449-EAEE-F599-AFE7106C7776}"/>
+              </a:ext>
+            </a:extLst>
+          </p:cNvPr>
+          <p:cNvPicPr>
+            <a:picLocks noChangeAspect="1"/>
+          </p:cNvPicPr>
+          <p:nvPr/>
+        </p:nvPicPr>
+        <p:blipFill>
+          <a:blip r:embed="rId3"/>
+          <a:stretch>
+            <a:fillRect/>
+          </a:stretch>
+        </p:blipFill>
+        <p:spPr>
+          <a:xfrm>
+            <a:off x="4232862" y="1307710"/>
+            <a:ext cx="3593339" cy="2149546"/>
+          </a:xfrm>
+          <a:prstGeom prst="rect">
+            <a:avLst/>
+          </a:prstGeom>
+          <a:ln w="3175">
+            <a:solidFill>
+              <a:schemeClr val="tx1"/>
+            </a:solidFill>
+          </a:ln>
+        </p:spPr>
+      </p:pic>
+      <p:pic>
+        <p:nvPicPr>
+          <p:cNvPr id="9" name="Picture 8">
+            <a:extLst>
+              <a:ext uri="{FF2B5EF4-FFF2-40B4-BE49-F238E27FC236}">
+                <a16:creationId xmlns:a16="http://schemas.microsoft.com/office/drawing/2014/main" id="{3652530A-6CD7-284F-91AB-0B398A92B4C4}"/>
+              </a:ext>
+            </a:extLst>
+          </p:cNvPr>
+          <p:cNvPicPr>
+            <a:picLocks noChangeAspect="1"/>
+          </p:cNvPicPr>
+          <p:nvPr/>
+        </p:nvPicPr>
+        <p:blipFill>
+          <a:blip r:embed="rId4"/>
+          <a:stretch>
+            <a:fillRect/>
+          </a:stretch>
+        </p:blipFill>
+        <p:spPr>
+          <a:xfrm>
+            <a:off x="8098508" y="1307710"/>
+            <a:ext cx="4004027" cy="2121289"/>
+          </a:xfrm>
+          <a:prstGeom prst="rect">
+            <a:avLst/>
+          </a:prstGeom>
+          <a:ln w="3175">
+            <a:solidFill>
+              <a:schemeClr val="tx1"/>
+            </a:solidFill>
+          </a:ln>
+        </p:spPr>
+      </p:pic>
+      <p:pic>
+        <p:nvPicPr>
+          <p:cNvPr id="12" name="Picture 11">
+            <a:extLst>
+              <a:ext uri="{FF2B5EF4-FFF2-40B4-BE49-F238E27FC236}">
+                <a16:creationId xmlns:a16="http://schemas.microsoft.com/office/drawing/2014/main" id="{09F224FB-C3FC-6C84-25E7-F892E3DC9E73}"/>
+              </a:ext>
+            </a:extLst>
+          </p:cNvPr>
+          <p:cNvPicPr>
+            <a:picLocks noChangeAspect="1"/>
+          </p:cNvPicPr>
+          <p:nvPr/>
+        </p:nvPicPr>
+        <p:blipFill>
+          <a:blip r:embed="rId4"/>
+          <a:stretch>
+            <a:fillRect/>
+          </a:stretch>
+        </p:blipFill>
+        <p:spPr>
+          <a:xfrm>
+            <a:off x="4198198" y="4187082"/>
+            <a:ext cx="3593340" cy="1999049"/>
+          </a:xfrm>
+          <a:prstGeom prst="rect">
+            <a:avLst/>
+          </a:prstGeom>
+          <a:ln w="3175">
+            <a:solidFill>
+              <a:schemeClr val="tx1"/>
+            </a:solidFill>
+          </a:ln>
+        </p:spPr>
+      </p:pic>
+      <p:sp>
+        <p:nvSpPr>
+          <p:cNvPr id="14" name="TextBox 13">
+            <a:extLst>
+              <a:ext uri="{FF2B5EF4-FFF2-40B4-BE49-F238E27FC236}">
+                <a16:creationId xmlns:a16="http://schemas.microsoft.com/office/drawing/2014/main" id="{86119567-FA02-4645-D1EB-9A1C99F5E98E}"/>
+              </a:ext>
+            </a:extLst>
+          </p:cNvPr>
+          <p:cNvSpPr txBox="1"/>
+          <p:nvPr/>
+        </p:nvSpPr>
+        <p:spPr>
+          <a:xfrm>
+            <a:off x="810706" y="3457256"/>
+            <a:ext cx="1994840" cy="307777"/>
+          </a:xfrm>
+          <a:prstGeom prst="rect">
+            <a:avLst/>
+          </a:prstGeom>
+          <a:noFill/>
+        </p:spPr>
+        <p:txBody>
+          <a:bodyPr wrap="square">
+            <a:spAutoFit/>
+          </a:bodyPr>
+          <a:lstStyle/>
+          <a:p>
+            <a:r>
+              <a:rPr lang="en-IN" sz="1400" b="0" dirty="0">
+                <a:effectLst/>
+                <a:highlight>
+                  <a:srgbClr val="F7F7F7"/>
+                </a:highlight>
+                <a:latin typeface="Courier New" panose="02070309020205020404" pitchFamily="49" charset="0"/>
+              </a:rPr>
+              <a:t>Model 0: RNN</a:t>
+            </a:r>
+          </a:p>
+        </p:txBody>
+      </p:sp>
+      <p:sp>
+        <p:nvSpPr>
+          <p:cNvPr id="15" name="TextBox 14">
+            <a:extLst>
+              <a:ext uri="{FF2B5EF4-FFF2-40B4-BE49-F238E27FC236}">
+                <a16:creationId xmlns:a16="http://schemas.microsoft.com/office/drawing/2014/main" id="{CBB3D580-5AFE-B5A3-65E0-28497D4AC858}"/>
+              </a:ext>
+            </a:extLst>
+          </p:cNvPr>
+          <p:cNvSpPr txBox="1"/>
+          <p:nvPr/>
+        </p:nvSpPr>
+        <p:spPr>
+          <a:xfrm>
+            <a:off x="4510062" y="3464730"/>
+            <a:ext cx="3096084" cy="738664"/>
+          </a:xfrm>
+          <a:prstGeom prst="rect">
+            <a:avLst/>
+          </a:prstGeom>
+          <a:noFill/>
+        </p:spPr>
+        <p:txBody>
+          <a:bodyPr wrap="square">
+            <a:spAutoFit/>
+          </a:bodyPr>
+          <a:lstStyle/>
+          <a:p>
+            <a:pPr algn="ctr"/>
+            <a:r>
+              <a:rPr lang="en-IN" sz="1400" b="0" dirty="0">
+                <a:effectLst/>
+                <a:highlight>
+                  <a:srgbClr val="F7F7F7"/>
+                </a:highlight>
+                <a:latin typeface="Courier New" panose="02070309020205020404" pitchFamily="49" charset="0"/>
+              </a:rPr>
+              <a:t>Model 1: RNN + </a:t>
+            </a:r>
+            <a:r>
+              <a:rPr lang="en-IN" sz="1400" b="0" dirty="0" err="1">
+                <a:effectLst/>
+                <a:highlight>
+                  <a:srgbClr val="F7F7F7"/>
+                </a:highlight>
+                <a:latin typeface="Courier New" panose="02070309020205020404" pitchFamily="49" charset="0"/>
+              </a:rPr>
+              <a:t>TimeDistributed</a:t>
+            </a:r>
+            <a:r>
+              <a:rPr lang="en-IN" sz="1400" b="0" dirty="0">
+                <a:effectLst/>
+                <a:highlight>
+                  <a:srgbClr val="F7F7F7"/>
+                </a:highlight>
+                <a:latin typeface="Courier New" panose="02070309020205020404" pitchFamily="49" charset="0"/>
+              </a:rPr>
+              <a:t> Dense</a:t>
+            </a:r>
+          </a:p>
+          <a:p>
+            <a:pPr algn="ctr"/>
+            <a:endParaRPr lang="en-IN" sz="1400" b="0" dirty="0">
+              <a:effectLst/>
+              <a:highlight>
+                <a:srgbClr val="F7F7F7"/>
+              </a:highlight>
+              <a:latin typeface="Courier New" panose="02070309020205020404" pitchFamily="49" charset="0"/>
+            </a:endParaRPr>
+          </a:p>
+        </p:txBody>
+      </p:sp>
+      <p:sp>
+        <p:nvSpPr>
+          <p:cNvPr id="17" name="TextBox 16">
+            <a:extLst>
+              <a:ext uri="{FF2B5EF4-FFF2-40B4-BE49-F238E27FC236}">
+                <a16:creationId xmlns:a16="http://schemas.microsoft.com/office/drawing/2014/main" id="{146A84AF-24C4-2F5F-AE78-E7364D472987}"/>
+              </a:ext>
+            </a:extLst>
+          </p:cNvPr>
+          <p:cNvSpPr txBox="1"/>
+          <p:nvPr/>
+        </p:nvSpPr>
+        <p:spPr>
+          <a:xfrm>
+            <a:off x="8623620" y="3425121"/>
+            <a:ext cx="3478915" cy="523220"/>
+          </a:xfrm>
+          <a:prstGeom prst="rect">
+            <a:avLst/>
+          </a:prstGeom>
+          <a:noFill/>
+        </p:spPr>
+        <p:txBody>
+          <a:bodyPr wrap="square">
+            <a:spAutoFit/>
+          </a:bodyPr>
+          <a:lstStyle/>
+          <a:p>
+            <a:pPr algn="ctr"/>
+            <a:r>
+              <a:rPr lang="en-IN" sz="1400" b="0" dirty="0">
+                <a:effectLst/>
+                <a:highlight>
+                  <a:srgbClr val="F7F7F7"/>
+                </a:highlight>
+                <a:latin typeface="Courier New" panose="02070309020205020404" pitchFamily="49" charset="0"/>
+              </a:rPr>
+              <a:t>Model 2: CNN + RNN + </a:t>
+            </a:r>
+            <a:r>
+              <a:rPr lang="en-IN" sz="1400" b="0" dirty="0" err="1">
+                <a:effectLst/>
+                <a:highlight>
+                  <a:srgbClr val="F7F7F7"/>
+                </a:highlight>
+                <a:latin typeface="Courier New" panose="02070309020205020404" pitchFamily="49" charset="0"/>
+              </a:rPr>
+              <a:t>TimeDistributed</a:t>
+            </a:r>
+            <a:r>
+              <a:rPr lang="en-IN" sz="1400" b="0" dirty="0">
+                <a:effectLst/>
+                <a:highlight>
+                  <a:srgbClr val="F7F7F7"/>
+                </a:highlight>
+                <a:latin typeface="Courier New" panose="02070309020205020404" pitchFamily="49" charset="0"/>
+              </a:rPr>
+              <a:t> Dense</a:t>
+            </a:r>
+          </a:p>
+        </p:txBody>
+      </p:sp>
+      <p:sp>
+        <p:nvSpPr>
+          <p:cNvPr id="20" name="TextBox 19">
+            <a:extLst>
+              <a:ext uri="{FF2B5EF4-FFF2-40B4-BE49-F238E27FC236}">
+                <a16:creationId xmlns:a16="http://schemas.microsoft.com/office/drawing/2014/main" id="{C5CA9786-0D08-0B86-DE26-22CFC5E962FE}"/>
+              </a:ext>
+            </a:extLst>
+          </p:cNvPr>
+          <p:cNvSpPr txBox="1"/>
+          <p:nvPr/>
+        </p:nvSpPr>
+        <p:spPr>
+          <a:xfrm>
+            <a:off x="4151051" y="6197644"/>
+            <a:ext cx="3787774" cy="523220"/>
+          </a:xfrm>
+          <a:prstGeom prst="rect">
+            <a:avLst/>
+          </a:prstGeom>
+          <a:noFill/>
+        </p:spPr>
+        <p:txBody>
+          <a:bodyPr wrap="square">
+            <a:spAutoFit/>
+          </a:bodyPr>
+          <a:lstStyle/>
+          <a:p>
+            <a:pPr algn="ctr"/>
+            <a:r>
+              <a:rPr lang="en-IN" sz="1400" b="0" dirty="0">
+                <a:effectLst/>
+                <a:highlight>
+                  <a:srgbClr val="F7F7F7"/>
+                </a:highlight>
+                <a:latin typeface="Courier New" panose="02070309020205020404" pitchFamily="49" charset="0"/>
+              </a:rPr>
+              <a:t>Model 4: Bidirectional RNN + </a:t>
+            </a:r>
+            <a:r>
+              <a:rPr lang="en-IN" sz="1400" b="0" dirty="0" err="1">
+                <a:effectLst/>
+                <a:highlight>
+                  <a:srgbClr val="F7F7F7"/>
+                </a:highlight>
+                <a:latin typeface="Courier New" panose="02070309020205020404" pitchFamily="49" charset="0"/>
+              </a:rPr>
+              <a:t>TimeDistributed</a:t>
+            </a:r>
+            <a:r>
+              <a:rPr lang="en-IN" sz="1400" b="0" dirty="0">
+                <a:effectLst/>
+                <a:highlight>
+                  <a:srgbClr val="F7F7F7"/>
+                </a:highlight>
+                <a:latin typeface="Courier New" panose="02070309020205020404" pitchFamily="49" charset="0"/>
+              </a:rPr>
+              <a:t> Dense</a:t>
+            </a:r>
+            <a:endParaRPr lang="en-IN" sz="1400" dirty="0"/>
+          </a:p>
+        </p:txBody>
+      </p:sp>
+      <p:pic>
+        <p:nvPicPr>
+          <p:cNvPr id="22" name="Picture 21">
+            <a:extLst>
+              <a:ext uri="{FF2B5EF4-FFF2-40B4-BE49-F238E27FC236}">
+                <a16:creationId xmlns:a16="http://schemas.microsoft.com/office/drawing/2014/main" id="{95A0A70E-D134-B365-2879-B7F5B707AC71}"/>
+              </a:ext>
+            </a:extLst>
+          </p:cNvPr>
+          <p:cNvPicPr>
+            <a:picLocks noChangeAspect="1"/>
+          </p:cNvPicPr>
+          <p:nvPr/>
+        </p:nvPicPr>
+        <p:blipFill>
+          <a:blip r:embed="rId4"/>
+          <a:stretch>
+            <a:fillRect/>
+          </a:stretch>
+        </p:blipFill>
+        <p:spPr>
+          <a:xfrm>
+            <a:off x="7976929" y="4169157"/>
+            <a:ext cx="4004027" cy="2016975"/>
+          </a:xfrm>
+          <a:prstGeom prst="rect">
+            <a:avLst/>
+          </a:prstGeom>
+          <a:ln w="3175">
+            <a:solidFill>
+              <a:schemeClr val="tx1"/>
+            </a:solidFill>
+          </a:ln>
+        </p:spPr>
+      </p:pic>
+      <p:sp>
+        <p:nvSpPr>
+          <p:cNvPr id="23" name="TextBox 22">
+            <a:extLst>
+              <a:ext uri="{FF2B5EF4-FFF2-40B4-BE49-F238E27FC236}">
+                <a16:creationId xmlns:a16="http://schemas.microsoft.com/office/drawing/2014/main" id="{E2CE7243-A7B1-A4AA-4025-CC6F53AEBFF7}"/>
+              </a:ext>
+            </a:extLst>
+          </p:cNvPr>
+          <p:cNvSpPr txBox="1"/>
+          <p:nvPr/>
+        </p:nvSpPr>
+        <p:spPr>
+          <a:xfrm>
+            <a:off x="7633332" y="6197644"/>
+            <a:ext cx="4469203" cy="523220"/>
+          </a:xfrm>
+          <a:prstGeom prst="rect">
+            <a:avLst/>
+          </a:prstGeom>
+          <a:noFill/>
+        </p:spPr>
+        <p:txBody>
+          <a:bodyPr wrap="square">
+            <a:spAutoFit/>
+          </a:bodyPr>
+          <a:lstStyle/>
+          <a:p>
+            <a:pPr algn="ctr"/>
+            <a:r>
+              <a:rPr lang="en-IN" sz="1400" b="0" dirty="0">
+                <a:effectLst/>
+                <a:highlight>
+                  <a:srgbClr val="F7F7F7"/>
+                </a:highlight>
+                <a:latin typeface="Courier New" panose="02070309020205020404" pitchFamily="49" charset="0"/>
+              </a:rPr>
+              <a:t>Model Final: CNN + Deeper RNN + </a:t>
+            </a:r>
+            <a:r>
+              <a:rPr lang="en-IN" sz="1400" b="0" dirty="0" err="1">
+                <a:effectLst/>
+                <a:highlight>
+                  <a:srgbClr val="F7F7F7"/>
+                </a:highlight>
+                <a:latin typeface="Courier New" panose="02070309020205020404" pitchFamily="49" charset="0"/>
+              </a:rPr>
+              <a:t>TimeDistributed</a:t>
+            </a:r>
+            <a:r>
+              <a:rPr lang="en-IN" sz="1400" b="0" dirty="0">
+                <a:effectLst/>
+                <a:highlight>
+                  <a:srgbClr val="F7F7F7"/>
+                </a:highlight>
+                <a:latin typeface="Courier New" panose="02070309020205020404" pitchFamily="49" charset="0"/>
+              </a:rPr>
+              <a:t> Dense</a:t>
+            </a:r>
+          </a:p>
+        </p:txBody>
+      </p:sp>
+      <p:pic>
+        <p:nvPicPr>
+          <p:cNvPr id="3" name="Picture 2">
+            <a:extLst>
+              <a:ext uri="{FF2B5EF4-FFF2-40B4-BE49-F238E27FC236}">
+                <a16:creationId xmlns:a16="http://schemas.microsoft.com/office/drawing/2014/main" id="{9C5B5976-BCAC-15A9-CBA0-D5E53EEF72AF}"/>
+              </a:ext>
+            </a:extLst>
+          </p:cNvPr>
+          <p:cNvPicPr>
+            <a:picLocks noChangeAspect="1"/>
+          </p:cNvPicPr>
+          <p:nvPr/>
+        </p:nvPicPr>
+        <p:blipFill>
+          <a:blip r:embed="rId5"/>
+          <a:stretch>
+            <a:fillRect/>
+          </a:stretch>
+        </p:blipFill>
+        <p:spPr>
+          <a:xfrm>
+            <a:off x="343986" y="4169157"/>
+            <a:ext cx="3436282" cy="2028487"/>
+          </a:xfrm>
+          <a:prstGeom prst="rect">
+            <a:avLst/>
+          </a:prstGeom>
+          <a:ln w="6350">
+            <a:solidFill>
+              <a:schemeClr val="tx1"/>
+            </a:solidFill>
+          </a:ln>
+        </p:spPr>
+      </p:pic>
+      <p:sp>
+        <p:nvSpPr>
+          <p:cNvPr id="4" name="TextBox 3">
+            <a:extLst>
+              <a:ext uri="{FF2B5EF4-FFF2-40B4-BE49-F238E27FC236}">
+                <a16:creationId xmlns:a16="http://schemas.microsoft.com/office/drawing/2014/main" id="{38B8515E-465C-47ED-0855-2DAC00775BA1}"/>
+              </a:ext>
+            </a:extLst>
+          </p:cNvPr>
+          <p:cNvSpPr txBox="1"/>
+          <p:nvPr/>
+        </p:nvSpPr>
+        <p:spPr>
+          <a:xfrm>
+            <a:off x="343985" y="6186132"/>
+            <a:ext cx="3475910" cy="738664"/>
+          </a:xfrm>
+          <a:prstGeom prst="rect">
+            <a:avLst/>
+          </a:prstGeom>
+          <a:noFill/>
+        </p:spPr>
+        <p:txBody>
+          <a:bodyPr wrap="square">
+            <a:spAutoFit/>
+          </a:bodyPr>
+          <a:lstStyle/>
+          <a:p>
+            <a:pPr algn="ctr"/>
+            <a:r>
+              <a:rPr lang="en-IN" sz="1400" b="0" dirty="0">
+                <a:effectLst/>
+                <a:highlight>
+                  <a:srgbClr val="F7F7F7"/>
+                </a:highlight>
+                <a:latin typeface="Courier New" panose="02070309020205020404" pitchFamily="49" charset="0"/>
+              </a:rPr>
+              <a:t>Model 3: Deeper RNN + </a:t>
+            </a:r>
+            <a:r>
+              <a:rPr lang="en-IN" sz="1400" b="0" dirty="0" err="1">
+                <a:effectLst/>
+                <a:highlight>
+                  <a:srgbClr val="F7F7F7"/>
+                </a:highlight>
+                <a:latin typeface="Courier New" panose="02070309020205020404" pitchFamily="49" charset="0"/>
+              </a:rPr>
+              <a:t>TimeDistributed</a:t>
+            </a:r>
+            <a:r>
+              <a:rPr lang="en-IN" sz="1400" b="0" dirty="0">
+                <a:effectLst/>
+                <a:highlight>
+                  <a:srgbClr val="F7F7F7"/>
+                </a:highlight>
+                <a:latin typeface="Courier New" panose="02070309020205020404" pitchFamily="49" charset="0"/>
+              </a:rPr>
+              <a:t> Dense</a:t>
+            </a:r>
+          </a:p>
+          <a:p>
+            <a:pPr algn="ctr"/>
+            <a:endParaRPr lang="en-IN" sz="1400" b="0" dirty="0">
+              <a:effectLst/>
+              <a:highlight>
+                <a:srgbClr val="F7F7F7"/>
+              </a:highlight>
+              <a:latin typeface="Courier New" panose="02070309020205020404" pitchFamily="49" charset="0"/>
+            </a:endParaRPr>
           </a:p>
         </p:txBody>
       </p:sp>
     </p:spTree>
     <p:extLst>
       <p:ext uri="{BB962C8B-B14F-4D97-AF65-F5344CB8AC3E}">
-        <p14:creationId xmlns:p14="http://schemas.microsoft.com/office/powerpoint/2010/main" val="2987620234"/>
+        <p14:creationId xmlns:p14="http://schemas.microsoft.com/office/powerpoint/2010/main" val="1306230644"/>
       </p:ext>
     </p:extLst>
   </p:cSld>
@@ -6335,6 +6368,394 @@
       </p:grpSpPr>
       <p:sp>
         <p:nvSpPr>
+          <p:cNvPr id="4" name="TextBox 3">
+            <a:extLst>
+              <a:ext uri="{FF2B5EF4-FFF2-40B4-BE49-F238E27FC236}">
+                <a16:creationId xmlns:a16="http://schemas.microsoft.com/office/drawing/2014/main" id="{095E4420-563C-BE8C-79BA-9E65D524C61A}"/>
+              </a:ext>
+            </a:extLst>
+          </p:cNvPr>
+          <p:cNvSpPr txBox="1"/>
+          <p:nvPr/>
+        </p:nvSpPr>
+        <p:spPr>
+          <a:xfrm>
+            <a:off x="540643" y="580090"/>
+            <a:ext cx="6581391" cy="338554"/>
+          </a:xfrm>
+          <a:prstGeom prst="rect">
+            <a:avLst/>
+          </a:prstGeom>
+          <a:noFill/>
+        </p:spPr>
+        <p:txBody>
+          <a:bodyPr wrap="square" rtlCol="0">
+            <a:spAutoFit/>
+          </a:bodyPr>
+          <a:lstStyle/>
+          <a:p>
+            <a:r>
+              <a:rPr lang="en-IN" sz="1600" dirty="0" err="1"/>
+              <a:t>Tra</a:t>
+            </a:r>
+            <a:endParaRPr lang="en-IN" sz="1600" dirty="0"/>
+          </a:p>
+        </p:txBody>
+      </p:sp>
+      <p:pic>
+        <p:nvPicPr>
+          <p:cNvPr id="2050" name="Picture 2">
+            <a:extLst>
+              <a:ext uri="{FF2B5EF4-FFF2-40B4-BE49-F238E27FC236}">
+                <a16:creationId xmlns:a16="http://schemas.microsoft.com/office/drawing/2014/main" id="{D65AFFF4-93B7-7A24-6116-01C4B3380755}"/>
+              </a:ext>
+            </a:extLst>
+          </p:cNvPr>
+          <p:cNvPicPr>
+            <a:picLocks noChangeAspect="1" noChangeArrowheads="1"/>
+          </p:cNvPicPr>
+          <p:nvPr/>
+        </p:nvPicPr>
+        <p:blipFill>
+          <a:blip r:embed="rId2">
+            <a:extLst>
+              <a:ext uri="{28A0092B-C50C-407E-A947-70E740481C1C}">
+                <a14:useLocalDpi xmlns:a14="http://schemas.microsoft.com/office/drawing/2010/main" val="0"/>
+              </a:ext>
+            </a:extLst>
+          </a:blip>
+          <a:srcRect/>
+          <a:stretch>
+            <a:fillRect/>
+          </a:stretch>
+        </p:blipFill>
+        <p:spPr bwMode="auto">
+          <a:xfrm>
+            <a:off x="369303" y="1443761"/>
+            <a:ext cx="11453394" cy="3995506"/>
+          </a:xfrm>
+          <a:prstGeom prst="rect">
+            <a:avLst/>
+          </a:prstGeom>
+          <a:noFill/>
+          <a:extLst>
+            <a:ext uri="{909E8E84-426E-40DD-AFC4-6F175D3DCCD1}">
+              <a14:hiddenFill xmlns:a14="http://schemas.microsoft.com/office/drawing/2010/main">
+                <a:solidFill>
+                  <a:srgbClr val="FFFFFF"/>
+                </a:solidFill>
+              </a14:hiddenFill>
+            </a:ext>
+          </a:extLst>
+        </p:spPr>
+      </p:pic>
+      <p:sp>
+        <p:nvSpPr>
+          <p:cNvPr id="2" name="TextBox 1">
+            <a:extLst>
+              <a:ext uri="{FF2B5EF4-FFF2-40B4-BE49-F238E27FC236}">
+                <a16:creationId xmlns:a16="http://schemas.microsoft.com/office/drawing/2014/main" id="{9E6955E8-2E35-71CB-FB60-DD9924E37E0E}"/>
+              </a:ext>
+            </a:extLst>
+          </p:cNvPr>
+          <p:cNvSpPr txBox="1"/>
+          <p:nvPr/>
+        </p:nvSpPr>
+        <p:spPr>
+          <a:xfrm>
+            <a:off x="511276" y="493449"/>
+            <a:ext cx="7435520" cy="523220"/>
+          </a:xfrm>
+          <a:prstGeom prst="rect">
+            <a:avLst/>
+          </a:prstGeom>
+          <a:noFill/>
+        </p:spPr>
+        <p:txBody>
+          <a:bodyPr wrap="square">
+            <a:spAutoFit/>
+          </a:bodyPr>
+          <a:lstStyle/>
+          <a:p>
+            <a:pPr algn="l"/>
+            <a:r>
+              <a:rPr lang="en-US" sz="2800" b="1" i="0" dirty="0">
+                <a:solidFill>
+                  <a:srgbClr val="222222"/>
+                </a:solidFill>
+                <a:effectLst/>
+                <a:highlight>
+                  <a:srgbClr val="FFFFFF"/>
+                </a:highlight>
+                <a:latin typeface="Arial" panose="020B0604020202020204" pitchFamily="34" charset="0"/>
+              </a:rPr>
+              <a:t>Training and Validation Loss PLOTs</a:t>
+            </a:r>
+          </a:p>
+        </p:txBody>
+      </p:sp>
+      <p:sp>
+        <p:nvSpPr>
+          <p:cNvPr id="3" name="TextBox 2">
+            <a:extLst>
+              <a:ext uri="{FF2B5EF4-FFF2-40B4-BE49-F238E27FC236}">
+                <a16:creationId xmlns:a16="http://schemas.microsoft.com/office/drawing/2014/main" id="{700FCE72-3E38-290A-A354-154798D16C65}"/>
+              </a:ext>
+            </a:extLst>
+          </p:cNvPr>
+          <p:cNvSpPr txBox="1"/>
+          <p:nvPr/>
+        </p:nvSpPr>
+        <p:spPr>
+          <a:xfrm>
+            <a:off x="791852" y="5491163"/>
+            <a:ext cx="10708849" cy="646331"/>
+          </a:xfrm>
+          <a:prstGeom prst="rect">
+            <a:avLst/>
+          </a:prstGeom>
+          <a:noFill/>
+        </p:spPr>
+        <p:txBody>
+          <a:bodyPr wrap="square" rtlCol="0">
+            <a:spAutoFit/>
+          </a:bodyPr>
+          <a:lstStyle/>
+          <a:p>
+            <a:r>
+              <a:rPr lang="en-US" dirty="0"/>
+              <a:t>Only model seemed to converge on validation loss is “model end”. So we continued to run it for 40 epochs. Though no significant improvement on validation loss, it did not significantly deteriorate as well.</a:t>
+            </a:r>
+            <a:endParaRPr lang="en-IN" dirty="0"/>
+          </a:p>
+        </p:txBody>
+      </p:sp>
+    </p:spTree>
+    <p:extLst>
+      <p:ext uri="{BB962C8B-B14F-4D97-AF65-F5344CB8AC3E}">
+        <p14:creationId xmlns:p14="http://schemas.microsoft.com/office/powerpoint/2010/main" val="2987620234"/>
+      </p:ext>
+    </p:extLst>
+  </p:cSld>
+  <p:clrMapOvr>
+    <a:masterClrMapping/>
+  </p:clrMapOvr>
+</p:sld>
+</file>
+
+<file path=ppt/slides/slide7.xml><?xml version="1.0" encoding="utf-8"?>
+<p:sld xmlns:a="http://schemas.openxmlformats.org/drawingml/2006/main" xmlns:r="http://schemas.openxmlformats.org/officeDocument/2006/relationships" xmlns:p="http://schemas.openxmlformats.org/presentationml/2006/main">
+  <p:cSld>
+    <p:spTree>
+      <p:nvGrpSpPr>
+        <p:cNvPr id="1" name=""/>
+        <p:cNvGrpSpPr/>
+        <p:nvPr/>
+      </p:nvGrpSpPr>
+      <p:grpSpPr>
+        <a:xfrm>
+          <a:off x="0" y="0"/>
+          <a:ext cx="0" cy="0"/>
+          <a:chOff x="0" y="0"/>
+          <a:chExt cx="0" cy="0"/>
+        </a:xfrm>
+      </p:grpSpPr>
+      <p:sp>
+        <p:nvSpPr>
+          <p:cNvPr id="4" name="TextBox 3">
+            <a:extLst>
+              <a:ext uri="{FF2B5EF4-FFF2-40B4-BE49-F238E27FC236}">
+                <a16:creationId xmlns:a16="http://schemas.microsoft.com/office/drawing/2014/main" id="{095E4420-563C-BE8C-79BA-9E65D524C61A}"/>
+              </a:ext>
+            </a:extLst>
+          </p:cNvPr>
+          <p:cNvSpPr txBox="1"/>
+          <p:nvPr/>
+        </p:nvSpPr>
+        <p:spPr>
+          <a:xfrm>
+            <a:off x="540643" y="580090"/>
+            <a:ext cx="6581391" cy="338554"/>
+          </a:xfrm>
+          <a:prstGeom prst="rect">
+            <a:avLst/>
+          </a:prstGeom>
+          <a:noFill/>
+        </p:spPr>
+        <p:txBody>
+          <a:bodyPr wrap="square" rtlCol="0">
+            <a:spAutoFit/>
+          </a:bodyPr>
+          <a:lstStyle/>
+          <a:p>
+            <a:r>
+              <a:rPr lang="en-IN" sz="1600" dirty="0" err="1"/>
+              <a:t>Tra</a:t>
+            </a:r>
+            <a:endParaRPr lang="en-IN" sz="1600" dirty="0"/>
+          </a:p>
+        </p:txBody>
+      </p:sp>
+      <p:sp>
+        <p:nvSpPr>
+          <p:cNvPr id="2" name="TextBox 1">
+            <a:extLst>
+              <a:ext uri="{FF2B5EF4-FFF2-40B4-BE49-F238E27FC236}">
+                <a16:creationId xmlns:a16="http://schemas.microsoft.com/office/drawing/2014/main" id="{9E6955E8-2E35-71CB-FB60-DD9924E37E0E}"/>
+              </a:ext>
+            </a:extLst>
+          </p:cNvPr>
+          <p:cNvSpPr txBox="1"/>
+          <p:nvPr/>
+        </p:nvSpPr>
+        <p:spPr>
+          <a:xfrm>
+            <a:off x="511276" y="493449"/>
+            <a:ext cx="7435520" cy="523220"/>
+          </a:xfrm>
+          <a:prstGeom prst="rect">
+            <a:avLst/>
+          </a:prstGeom>
+          <a:noFill/>
+        </p:spPr>
+        <p:txBody>
+          <a:bodyPr wrap="square">
+            <a:spAutoFit/>
+          </a:bodyPr>
+          <a:lstStyle/>
+          <a:p>
+            <a:pPr algn="l"/>
+            <a:r>
+              <a:rPr lang="en-US" sz="2800" b="1" i="0" dirty="0">
+                <a:solidFill>
+                  <a:srgbClr val="222222"/>
+                </a:solidFill>
+                <a:effectLst/>
+                <a:highlight>
+                  <a:srgbClr val="FFFFFF"/>
+                </a:highlight>
+                <a:latin typeface="Arial" panose="020B0604020202020204" pitchFamily="34" charset="0"/>
+              </a:rPr>
+              <a:t>Fine Tuning Converging Model</a:t>
+            </a:r>
+          </a:p>
+        </p:txBody>
+      </p:sp>
+      <p:pic>
+        <p:nvPicPr>
+          <p:cNvPr id="3074" name="Picture 2">
+            <a:extLst>
+              <a:ext uri="{FF2B5EF4-FFF2-40B4-BE49-F238E27FC236}">
+                <a16:creationId xmlns:a16="http://schemas.microsoft.com/office/drawing/2014/main" id="{6B3E2380-0136-A58F-2974-CB9BD5F43B5A}"/>
+              </a:ext>
+            </a:extLst>
+          </p:cNvPr>
+          <p:cNvPicPr>
+            <a:picLocks noChangeAspect="1" noChangeArrowheads="1"/>
+          </p:cNvPicPr>
+          <p:nvPr/>
+        </p:nvPicPr>
+        <p:blipFill>
+          <a:blip r:embed="rId2">
+            <a:extLst>
+              <a:ext uri="{28A0092B-C50C-407E-A947-70E740481C1C}">
+                <a14:useLocalDpi xmlns:a14="http://schemas.microsoft.com/office/drawing/2010/main" val="0"/>
+              </a:ext>
+            </a:extLst>
+          </a:blip>
+          <a:srcRect/>
+          <a:stretch>
+            <a:fillRect/>
+          </a:stretch>
+        </p:blipFill>
+        <p:spPr bwMode="auto">
+          <a:xfrm>
+            <a:off x="791852" y="1365250"/>
+            <a:ext cx="10520313" cy="4125913"/>
+          </a:xfrm>
+          <a:prstGeom prst="rect">
+            <a:avLst/>
+          </a:prstGeom>
+          <a:noFill/>
+          <a:extLst>
+            <a:ext uri="{909E8E84-426E-40DD-AFC4-6F175D3DCCD1}">
+              <a14:hiddenFill xmlns:a14="http://schemas.microsoft.com/office/drawing/2010/main">
+                <a:solidFill>
+                  <a:srgbClr val="FFFFFF"/>
+                </a:solidFill>
+              </a14:hiddenFill>
+            </a:ext>
+          </a:extLst>
+        </p:spPr>
+      </p:pic>
+      <p:sp>
+        <p:nvSpPr>
+          <p:cNvPr id="3" name="TextBox 2">
+            <a:extLst>
+              <a:ext uri="{FF2B5EF4-FFF2-40B4-BE49-F238E27FC236}">
+                <a16:creationId xmlns:a16="http://schemas.microsoft.com/office/drawing/2014/main" id="{8C5B1BE0-1D5A-7FE3-B178-44DC0B29594A}"/>
+              </a:ext>
+            </a:extLst>
+          </p:cNvPr>
+          <p:cNvSpPr txBox="1"/>
+          <p:nvPr/>
+        </p:nvSpPr>
+        <p:spPr>
+          <a:xfrm>
+            <a:off x="791852" y="5491163"/>
+            <a:ext cx="10708849" cy="923330"/>
+          </a:xfrm>
+          <a:prstGeom prst="rect">
+            <a:avLst/>
+          </a:prstGeom>
+          <a:noFill/>
+        </p:spPr>
+        <p:txBody>
+          <a:bodyPr wrap="square" rtlCol="0">
+            <a:spAutoFit/>
+          </a:bodyPr>
+          <a:lstStyle/>
+          <a:p>
+            <a:r>
+              <a:rPr lang="en-US" dirty="0"/>
+              <a:t>Fine tuned final model to have the right number of CNN filters, best performance is observed when number of filters in CNN 1D later is equal to 29, number of characters in character map. Tried with multiples of 29, but right around 29 filters seemed good.</a:t>
+            </a:r>
+            <a:endParaRPr lang="en-IN" dirty="0"/>
+          </a:p>
+        </p:txBody>
+      </p:sp>
+    </p:spTree>
+    <p:extLst>
+      <p:ext uri="{BB962C8B-B14F-4D97-AF65-F5344CB8AC3E}">
+        <p14:creationId xmlns:p14="http://schemas.microsoft.com/office/powerpoint/2010/main" val="3617351340"/>
+      </p:ext>
+    </p:extLst>
+  </p:cSld>
+  <p:clrMapOvr>
+    <a:masterClrMapping/>
+  </p:clrMapOvr>
+</p:sld>
+</file>
+
+<file path=ppt/slides/slide8.xml><?xml version="1.0" encoding="utf-8"?>
+<p:sld xmlns:a="http://schemas.openxmlformats.org/drawingml/2006/main" xmlns:r="http://schemas.openxmlformats.org/officeDocument/2006/relationships" xmlns:p="http://schemas.openxmlformats.org/presentationml/2006/main">
+  <p:cSld>
+    <p:spTree>
+      <p:nvGrpSpPr>
+        <p:cNvPr id="1" name=""/>
+        <p:cNvGrpSpPr/>
+        <p:nvPr/>
+      </p:nvGrpSpPr>
+      <p:grpSpPr>
+        <a:xfrm>
+          <a:off x="0" y="0"/>
+          <a:ext cx="0" cy="0"/>
+          <a:chOff x="0" y="0"/>
+          <a:chExt cx="0" cy="0"/>
+        </a:xfrm>
+      </p:grpSpPr>
+      <p:sp>
+        <p:nvSpPr>
           <p:cNvPr id="2" name="TextBox 1">
             <a:extLst>
               <a:ext uri="{FF2B5EF4-FFF2-40B4-BE49-F238E27FC236}">
@@ -6393,7 +6814,7 @@
           <p:nvPr>
             <p:extLst>
               <p:ext uri="{D42A27DB-BD31-4B8C-83A1-F6EECF244321}">
-                <p14:modId xmlns:p14="http://schemas.microsoft.com/office/powerpoint/2010/main" val="445364908"/>
+                <p14:modId xmlns:p14="http://schemas.microsoft.com/office/powerpoint/2010/main" val="261595772"/>
               </p:ext>
             </p:extLst>
           </p:nvPr>
@@ -6466,9 +6887,10 @@
                     <a:lstStyle/>
                     <a:p>
                       <a:r>
-                        <a:rPr lang="en-IN" dirty="0"/>
-                        <a:t>1</a:t>
+                        <a:rPr lang="en-US" dirty="0"/>
+                        <a:t>0</a:t>
                       </a:r>
+                      <a:endParaRPr lang="en-IN" dirty="0"/>
                     </a:p>
                   </a:txBody>
                   <a:tcPr/>
@@ -6478,6 +6900,11 @@
                     <a:bodyPr/>
                     <a:lstStyle/>
                     <a:p>
+                      <a:pPr algn="ctr"/>
+                      <a:r>
+                        <a:rPr lang="en-US" dirty="0"/>
+                        <a:t>88%</a:t>
+                      </a:r>
                       <a:endParaRPr lang="en-IN" dirty="0"/>
                     </a:p>
                   </a:txBody>
@@ -6496,9 +6923,10 @@
                     <a:lstStyle/>
                     <a:p>
                       <a:r>
-                        <a:rPr lang="en-IN" dirty="0"/>
-                        <a:t>2</a:t>
+                        <a:rPr lang="en-US" dirty="0"/>
+                        <a:t>1</a:t>
                       </a:r>
+                      <a:endParaRPr lang="en-IN" dirty="0"/>
                     </a:p>
                   </a:txBody>
                   <a:tcPr/>
@@ -6508,6 +6936,11 @@
                     <a:bodyPr/>
                     <a:lstStyle/>
                     <a:p>
+                      <a:pPr algn="ctr"/>
+                      <a:r>
+                        <a:rPr lang="en-US" dirty="0"/>
+                        <a:t>68%</a:t>
+                      </a:r>
                       <a:endParaRPr lang="en-IN" dirty="0"/>
                     </a:p>
                   </a:txBody>
@@ -6526,9 +6959,10 @@
                     <a:lstStyle/>
                     <a:p>
                       <a:r>
-                        <a:rPr lang="en-IN" dirty="0"/>
-                        <a:t>3</a:t>
+                        <a:rPr lang="en-US" dirty="0"/>
+                        <a:t>2</a:t>
                       </a:r>
+                      <a:endParaRPr lang="en-IN" dirty="0"/>
                     </a:p>
                   </a:txBody>
                   <a:tcPr/>
@@ -6538,7 +6972,12 @@
                     <a:bodyPr/>
                     <a:lstStyle/>
                     <a:p>
-                      <a:endParaRPr lang="en-IN"/>
+                      <a:pPr algn="ctr"/>
+                      <a:r>
+                        <a:rPr lang="en-US" dirty="0"/>
+                        <a:t>32%</a:t>
+                      </a:r>
+                      <a:endParaRPr lang="en-IN" dirty="0"/>
                     </a:p>
                   </a:txBody>
                   <a:tcPr/>
@@ -6556,9 +6995,10 @@
                     <a:lstStyle/>
                     <a:p>
                       <a:r>
-                        <a:rPr lang="en-IN" dirty="0"/>
-                        <a:t>4</a:t>
+                        <a:rPr lang="en-US" dirty="0"/>
+                        <a:t>3</a:t>
                       </a:r>
+                      <a:endParaRPr lang="en-IN" dirty="0"/>
                     </a:p>
                   </a:txBody>
                   <a:tcPr/>
@@ -6568,7 +7008,12 @@
                     <a:bodyPr/>
                     <a:lstStyle/>
                     <a:p>
-                      <a:endParaRPr lang="en-IN"/>
+                      <a:pPr algn="ctr"/>
+                      <a:r>
+                        <a:rPr lang="en-US" dirty="0"/>
+                        <a:t>43%</a:t>
+                      </a:r>
+                      <a:endParaRPr lang="en-IN" dirty="0"/>
                     </a:p>
                   </a:txBody>
                   <a:tcPr/>
@@ -6586,9 +7031,10 @@
                     <a:lstStyle/>
                     <a:p>
                       <a:r>
-                        <a:rPr lang="en-IN" dirty="0"/>
-                        <a:t>5</a:t>
+                        <a:rPr lang="en-US" dirty="0"/>
+                        <a:t>4</a:t>
                       </a:r>
+                      <a:endParaRPr lang="en-IN" dirty="0"/>
                     </a:p>
                   </a:txBody>
                   <a:tcPr/>
@@ -6598,7 +7044,12 @@
                     <a:bodyPr/>
                     <a:lstStyle/>
                     <a:p>
-                      <a:endParaRPr lang="en-IN"/>
+                      <a:pPr algn="ctr"/>
+                      <a:r>
+                        <a:rPr lang="en-US" dirty="0"/>
+                        <a:t>44%</a:t>
+                      </a:r>
+                      <a:endParaRPr lang="en-IN" dirty="0"/>
                     </a:p>
                   </a:txBody>
                   <a:tcPr/>
@@ -6616,9 +7067,14 @@
                     <a:lstStyle/>
                     <a:p>
                       <a:r>
-                        <a:rPr lang="en-IN" dirty="0"/>
-                        <a:t>6</a:t>
+                        <a:rPr lang="en-US" dirty="0"/>
+                        <a:t>E</a:t>
                       </a:r>
+                      <a:r>
+                        <a:rPr lang="en-IN" dirty="0" err="1"/>
+                        <a:t>nd</a:t>
+                      </a:r>
+                      <a:endParaRPr lang="en-IN" dirty="0"/>
                     </a:p>
                   </a:txBody>
                   <a:tcPr/>
@@ -6628,6 +7084,11 @@
                     <a:bodyPr/>
                     <a:lstStyle/>
                     <a:p>
+                      <a:pPr algn="ctr"/>
+                      <a:r>
+                        <a:rPr lang="en-US" dirty="0"/>
+                        <a:t>24%</a:t>
+                      </a:r>
                       <a:endParaRPr lang="en-IN" dirty="0"/>
                     </a:p>
                   </a:txBody>
@@ -6656,283 +7117,6 @@
 </p:sld>
 </file>
 
-<file path=ppt/slides/slide7.xml><?xml version="1.0" encoding="utf-8"?>
-<p:sld xmlns:a="http://schemas.openxmlformats.org/drawingml/2006/main" xmlns:r="http://schemas.openxmlformats.org/officeDocument/2006/relationships" xmlns:p="http://schemas.openxmlformats.org/presentationml/2006/main">
-  <p:cSld>
-    <p:spTree>
-      <p:nvGrpSpPr>
-        <p:cNvPr id="1" name=""/>
-        <p:cNvGrpSpPr/>
-        <p:nvPr/>
-      </p:nvGrpSpPr>
-      <p:grpSpPr>
-        <a:xfrm>
-          <a:off x="0" y="0"/>
-          <a:ext cx="0" cy="0"/>
-          <a:chOff x="0" y="0"/>
-          <a:chExt cx="0" cy="0"/>
-        </a:xfrm>
-      </p:grpSpPr>
-      <p:sp>
-        <p:nvSpPr>
-          <p:cNvPr id="4" name="Rectangle 3">
-            <a:extLst>
-              <a:ext uri="{FF2B5EF4-FFF2-40B4-BE49-F238E27FC236}">
-                <a16:creationId xmlns:a16="http://schemas.microsoft.com/office/drawing/2014/main" id="{B212C859-A0A6-E574-C504-9C23FFCF6D69}"/>
-              </a:ext>
-            </a:extLst>
-          </p:cNvPr>
-          <p:cNvSpPr/>
-          <p:nvPr/>
-        </p:nvSpPr>
-        <p:spPr>
-          <a:xfrm>
-            <a:off x="0" y="0"/>
-            <a:ext cx="12192000" cy="6858000"/>
-          </a:xfrm>
-          <a:prstGeom prst="rect">
-            <a:avLst/>
-          </a:prstGeom>
-          <a:solidFill>
-            <a:schemeClr val="accent1"/>
-          </a:solidFill>
-          <a:ln>
-            <a:noFill/>
-          </a:ln>
-        </p:spPr>
-        <p:style>
-          <a:lnRef idx="2">
-            <a:schemeClr val="accent1">
-              <a:shade val="15000"/>
-            </a:schemeClr>
-          </a:lnRef>
-          <a:fillRef idx="1">
-            <a:schemeClr val="accent1"/>
-          </a:fillRef>
-          <a:effectRef idx="0">
-            <a:schemeClr val="accent1"/>
-          </a:effectRef>
-          <a:fontRef idx="minor">
-            <a:schemeClr val="lt1"/>
-          </a:fontRef>
-        </p:style>
-        <p:txBody>
-          <a:bodyPr rtlCol="0" anchor="ctr"/>
-          <a:lstStyle/>
-          <a:p>
-            <a:pPr algn="ctr"/>
-            <a:r>
-              <a:rPr lang="en-IN" sz="6000" dirty="0"/>
-              <a:t>Appendix</a:t>
-            </a:r>
-          </a:p>
-        </p:txBody>
-      </p:sp>
-    </p:spTree>
-    <p:extLst>
-      <p:ext uri="{BB962C8B-B14F-4D97-AF65-F5344CB8AC3E}">
-        <p14:creationId xmlns:p14="http://schemas.microsoft.com/office/powerpoint/2010/main" val="3159226328"/>
-      </p:ext>
-    </p:extLst>
-  </p:cSld>
-  <p:clrMapOvr>
-    <a:masterClrMapping/>
-  </p:clrMapOvr>
-</p:sld>
-</file>
-
-<file path=ppt/slides/slide8.xml><?xml version="1.0" encoding="utf-8"?>
-<p:sld xmlns:a="http://schemas.openxmlformats.org/drawingml/2006/main" xmlns:r="http://schemas.openxmlformats.org/officeDocument/2006/relationships" xmlns:p="http://schemas.openxmlformats.org/presentationml/2006/main">
-  <p:cSld>
-    <p:spTree>
-      <p:nvGrpSpPr>
-        <p:cNvPr id="1" name=""/>
-        <p:cNvGrpSpPr/>
-        <p:nvPr/>
-      </p:nvGrpSpPr>
-      <p:grpSpPr>
-        <a:xfrm>
-          <a:off x="0" y="0"/>
-          <a:ext cx="0" cy="0"/>
-          <a:chOff x="0" y="0"/>
-          <a:chExt cx="0" cy="0"/>
-        </a:xfrm>
-      </p:grpSpPr>
-      <p:sp>
-        <p:nvSpPr>
-          <p:cNvPr id="5" name="TextBox 4">
-            <a:extLst>
-              <a:ext uri="{FF2B5EF4-FFF2-40B4-BE49-F238E27FC236}">
-                <a16:creationId xmlns:a16="http://schemas.microsoft.com/office/drawing/2014/main" id="{C47514DF-9E50-69B9-C042-F0AB834F2E00}"/>
-              </a:ext>
-            </a:extLst>
-          </p:cNvPr>
-          <p:cNvSpPr txBox="1"/>
-          <p:nvPr/>
-        </p:nvSpPr>
-        <p:spPr>
-          <a:xfrm>
-            <a:off x="3048000" y="2415796"/>
-            <a:ext cx="6096000" cy="2031325"/>
-          </a:xfrm>
-          <a:prstGeom prst="rect">
-            <a:avLst/>
-          </a:prstGeom>
-          <a:noFill/>
-        </p:spPr>
-        <p:txBody>
-          <a:bodyPr wrap="square">
-            <a:spAutoFit/>
-          </a:bodyPr>
-          <a:lstStyle/>
-          <a:p>
-            <a:pPr algn="l">
-              <a:buFont typeface="Arial" panose="020B0604020202020204" pitchFamily="34" charset="0"/>
-              <a:buChar char="•"/>
-            </a:pPr>
-            <a:r>
-              <a:rPr lang="en-US" b="0" i="0" dirty="0">
-                <a:solidFill>
-                  <a:srgbClr val="222222"/>
-                </a:solidFill>
-                <a:effectLst/>
-                <a:highlight>
-                  <a:srgbClr val="FFFFFF"/>
-                </a:highlight>
-                <a:latin typeface="Arial" panose="020B0604020202020204" pitchFamily="34" charset="0"/>
-              </a:rPr>
-              <a:t>Title of your capstone project</a:t>
-            </a:r>
-          </a:p>
-          <a:p>
-            <a:pPr algn="l">
-              <a:buFont typeface="Arial" panose="020B0604020202020204" pitchFamily="34" charset="0"/>
-              <a:buChar char="•"/>
-            </a:pPr>
-            <a:r>
-              <a:rPr lang="en-US" b="0" i="0" dirty="0">
-                <a:solidFill>
-                  <a:srgbClr val="222222"/>
-                </a:solidFill>
-                <a:effectLst/>
-                <a:highlight>
-                  <a:srgbClr val="FFFFFF"/>
-                </a:highlight>
-                <a:latin typeface="Arial" panose="020B0604020202020204" pitchFamily="34" charset="0"/>
-              </a:rPr>
-              <a:t>Name of your Supervisor from IISc</a:t>
-            </a:r>
-          </a:p>
-          <a:p>
-            <a:pPr algn="l">
-              <a:buFont typeface="Arial" panose="020B0604020202020204" pitchFamily="34" charset="0"/>
-              <a:buChar char="•"/>
-            </a:pPr>
-            <a:r>
-              <a:rPr lang="en-US" b="0" i="0" dirty="0">
-                <a:solidFill>
-                  <a:srgbClr val="222222"/>
-                </a:solidFill>
-                <a:effectLst/>
-                <a:highlight>
-                  <a:srgbClr val="FFFFFF"/>
-                </a:highlight>
-                <a:latin typeface="Arial" panose="020B0604020202020204" pitchFamily="34" charset="0"/>
-              </a:rPr>
-              <a:t>Details of the Datasets</a:t>
-            </a:r>
-          </a:p>
-          <a:p>
-            <a:pPr algn="l">
-              <a:buFont typeface="Arial" panose="020B0604020202020204" pitchFamily="34" charset="0"/>
-              <a:buChar char="•"/>
-            </a:pPr>
-            <a:r>
-              <a:rPr lang="en-US" b="0" i="0" dirty="0">
-                <a:solidFill>
-                  <a:srgbClr val="222222"/>
-                </a:solidFill>
-                <a:effectLst/>
-                <a:highlight>
-                  <a:srgbClr val="FFFFFF"/>
-                </a:highlight>
-                <a:latin typeface="Arial" panose="020B0604020202020204" pitchFamily="34" charset="0"/>
-              </a:rPr>
-              <a:t>Pre-processing steps</a:t>
-            </a:r>
-          </a:p>
-          <a:p>
-            <a:pPr algn="l">
-              <a:buFont typeface="Arial" panose="020B0604020202020204" pitchFamily="34" charset="0"/>
-              <a:buChar char="•"/>
-            </a:pPr>
-            <a:r>
-              <a:rPr lang="en-US" b="0" i="0" dirty="0">
-                <a:solidFill>
-                  <a:srgbClr val="222222"/>
-                </a:solidFill>
-                <a:effectLst/>
-                <a:highlight>
-                  <a:srgbClr val="FFFFFF"/>
-                </a:highlight>
-                <a:latin typeface="Arial" panose="020B0604020202020204" pitchFamily="34" charset="0"/>
-              </a:rPr>
-              <a:t>Method/Experiment highlighting the choice of your Model</a:t>
-            </a:r>
-          </a:p>
-          <a:p>
-            <a:pPr algn="l">
-              <a:buFont typeface="Arial" panose="020B0604020202020204" pitchFamily="34" charset="0"/>
-              <a:buChar char="•"/>
-            </a:pPr>
-            <a:r>
-              <a:rPr lang="en-US" b="0" i="0" dirty="0">
-                <a:solidFill>
-                  <a:srgbClr val="222222"/>
-                </a:solidFill>
-                <a:effectLst/>
-                <a:highlight>
-                  <a:srgbClr val="FFFFFF"/>
-                </a:highlight>
-                <a:latin typeface="Arial" panose="020B0604020202020204" pitchFamily="34" charset="0"/>
-              </a:rPr>
-              <a:t>The Performance Metrics </a:t>
-            </a:r>
-          </a:p>
-          <a:p>
-            <a:pPr algn="l">
-              <a:buFont typeface="Arial" panose="020B0604020202020204" pitchFamily="34" charset="0"/>
-              <a:buChar char="•"/>
-            </a:pPr>
-            <a:r>
-              <a:rPr lang="en-US" b="0" i="0" dirty="0">
-                <a:solidFill>
-                  <a:srgbClr val="222222"/>
-                </a:solidFill>
-                <a:effectLst/>
-                <a:highlight>
-                  <a:srgbClr val="FFFFFF"/>
-                </a:highlight>
-                <a:latin typeface="Arial" panose="020B0604020202020204" pitchFamily="34" charset="0"/>
-              </a:rPr>
-              <a:t>Conclusions  </a:t>
-            </a:r>
-          </a:p>
-        </p:txBody>
-      </p:sp>
-    </p:spTree>
-    <p:extLst>
-      <p:ext uri="{BB962C8B-B14F-4D97-AF65-F5344CB8AC3E}">
-        <p14:creationId xmlns:p14="http://schemas.microsoft.com/office/powerpoint/2010/main" val="3826706476"/>
-      </p:ext>
-    </p:extLst>
-  </p:cSld>
-  <p:clrMapOvr>
-    <a:masterClrMapping/>
-  </p:clrMapOvr>
-</p:sld>
-</file>
-
 <file path=ppt/slides/slide9.xml><?xml version="1.0" encoding="utf-8"?>
 <p:sld xmlns:a="http://schemas.openxmlformats.org/drawingml/2006/main" xmlns:r="http://schemas.openxmlformats.org/officeDocument/2006/relationships" xmlns:p="http://schemas.openxmlformats.org/presentationml/2006/main">
   <p:cSld>
@@ -6952,266 +7136,63 @@
       </p:grpSpPr>
       <p:sp>
         <p:nvSpPr>
-          <p:cNvPr id="3" name="TextBox 2">
-            <a:extLst>
-              <a:ext uri="{FF2B5EF4-FFF2-40B4-BE49-F238E27FC236}">
-                <a16:creationId xmlns:a16="http://schemas.microsoft.com/office/drawing/2014/main" id="{943C0E65-996D-E06B-CF55-7820DDF7FB6F}"/>
-              </a:ext>
-            </a:extLst>
-          </p:cNvPr>
-          <p:cNvSpPr txBox="1"/>
+          <p:cNvPr id="4" name="Rectangle 3">
+            <a:extLst>
+              <a:ext uri="{FF2B5EF4-FFF2-40B4-BE49-F238E27FC236}">
+                <a16:creationId xmlns:a16="http://schemas.microsoft.com/office/drawing/2014/main" id="{B212C859-A0A6-E574-C504-9C23FFCF6D69}"/>
+              </a:ext>
+            </a:extLst>
+          </p:cNvPr>
+          <p:cNvSpPr/>
           <p:nvPr/>
         </p:nvSpPr>
         <p:spPr>
           <a:xfrm>
-            <a:off x="3047134" y="2274838"/>
-            <a:ext cx="6094268" cy="2308324"/>
+            <a:off x="0" y="0"/>
+            <a:ext cx="12192000" cy="6858000"/>
           </a:xfrm>
           <a:prstGeom prst="rect">
             <a:avLst/>
           </a:prstGeom>
-          <a:noFill/>
-        </p:spPr>
-        <p:txBody>
-          <a:bodyPr wrap="square">
-            <a:spAutoFit/>
-          </a:bodyPr>
-          <a:lstStyle/>
-          <a:p>
-            <a:r>
-              <a:rPr lang="en-IN" b="0" dirty="0">
-                <a:solidFill>
-                  <a:srgbClr val="0000FF"/>
-                </a:solidFill>
-                <a:effectLst/>
-                <a:highlight>
-                  <a:srgbClr val="F7F7F7"/>
-                </a:highlight>
-                <a:latin typeface="Courier New" panose="02070309020205020404" pitchFamily="49" charset="0"/>
-              </a:rPr>
-              <a:t>######Model 0: RNN</a:t>
-            </a:r>
-            <a:endParaRPr lang="en-IN" b="0" dirty="0">
-              <a:solidFill>
-                <a:srgbClr val="000000"/>
-              </a:solidFill>
-              <a:effectLst/>
-              <a:highlight>
-                <a:srgbClr val="F7F7F7"/>
-              </a:highlight>
-              <a:latin typeface="Courier New" panose="02070309020205020404" pitchFamily="49" charset="0"/>
-            </a:endParaRPr>
-          </a:p>
-          <a:p>
-            <a:r>
-              <a:rPr lang="en-IN" b="0" dirty="0">
-                <a:solidFill>
-                  <a:srgbClr val="0000FF"/>
-                </a:solidFill>
-                <a:effectLst/>
-                <a:highlight>
-                  <a:srgbClr val="F7F7F7"/>
-                </a:highlight>
-                <a:latin typeface="Courier New" panose="02070309020205020404" pitchFamily="49" charset="0"/>
-              </a:rPr>
-              <a:t>######Model 1: RNN + </a:t>
-            </a:r>
-            <a:r>
-              <a:rPr lang="en-IN" b="0" dirty="0" err="1">
-                <a:solidFill>
-                  <a:srgbClr val="0000FF"/>
-                </a:solidFill>
-                <a:effectLst/>
-                <a:highlight>
-                  <a:srgbClr val="F7F7F7"/>
-                </a:highlight>
-                <a:latin typeface="Courier New" panose="02070309020205020404" pitchFamily="49" charset="0"/>
-              </a:rPr>
-              <a:t>TimeDistributed</a:t>
-            </a:r>
-            <a:r>
-              <a:rPr lang="en-IN" b="0" dirty="0">
-                <a:solidFill>
-                  <a:srgbClr val="0000FF"/>
-                </a:solidFill>
-                <a:effectLst/>
-                <a:highlight>
-                  <a:srgbClr val="F7F7F7"/>
-                </a:highlight>
-                <a:latin typeface="Courier New" panose="02070309020205020404" pitchFamily="49" charset="0"/>
-              </a:rPr>
-              <a:t> Dense</a:t>
-            </a:r>
-            <a:endParaRPr lang="en-IN" b="0" dirty="0">
-              <a:solidFill>
-                <a:srgbClr val="000000"/>
-              </a:solidFill>
-              <a:effectLst/>
-              <a:highlight>
-                <a:srgbClr val="F7F7F7"/>
-              </a:highlight>
-              <a:latin typeface="Courier New" panose="02070309020205020404" pitchFamily="49" charset="0"/>
-            </a:endParaRPr>
-          </a:p>
-          <a:p>
-            <a:r>
-              <a:rPr lang="en-IN" b="0" dirty="0">
-                <a:solidFill>
-                  <a:srgbClr val="0000FF"/>
-                </a:solidFill>
-                <a:effectLst/>
-                <a:highlight>
-                  <a:srgbClr val="F7F7F7"/>
-                </a:highlight>
-                <a:latin typeface="Courier New" panose="02070309020205020404" pitchFamily="49" charset="0"/>
-              </a:rPr>
-              <a:t>######Model 2: CNN + RNN + </a:t>
-            </a:r>
-            <a:r>
-              <a:rPr lang="en-IN" b="0" dirty="0" err="1">
-                <a:solidFill>
-                  <a:srgbClr val="0000FF"/>
-                </a:solidFill>
-                <a:effectLst/>
-                <a:highlight>
-                  <a:srgbClr val="F7F7F7"/>
-                </a:highlight>
-                <a:latin typeface="Courier New" panose="02070309020205020404" pitchFamily="49" charset="0"/>
-              </a:rPr>
-              <a:t>TimeDistributed</a:t>
-            </a:r>
-            <a:r>
-              <a:rPr lang="en-IN" b="0" dirty="0">
-                <a:solidFill>
-                  <a:srgbClr val="0000FF"/>
-                </a:solidFill>
-                <a:effectLst/>
-                <a:highlight>
-                  <a:srgbClr val="F7F7F7"/>
-                </a:highlight>
-                <a:latin typeface="Courier New" panose="02070309020205020404" pitchFamily="49" charset="0"/>
-              </a:rPr>
-              <a:t> Dense</a:t>
-            </a:r>
-            <a:endParaRPr lang="en-IN" b="0" dirty="0">
-              <a:solidFill>
-                <a:srgbClr val="000000"/>
-              </a:solidFill>
-              <a:effectLst/>
-              <a:highlight>
-                <a:srgbClr val="F7F7F7"/>
-              </a:highlight>
-              <a:latin typeface="Courier New" panose="02070309020205020404" pitchFamily="49" charset="0"/>
-            </a:endParaRPr>
-          </a:p>
-          <a:p>
-            <a:r>
-              <a:rPr lang="en-IN" b="0" dirty="0">
-                <a:solidFill>
-                  <a:srgbClr val="0000FF"/>
-                </a:solidFill>
-                <a:effectLst/>
-                <a:highlight>
-                  <a:srgbClr val="F7F7F7"/>
-                </a:highlight>
-                <a:latin typeface="Courier New" panose="02070309020205020404" pitchFamily="49" charset="0"/>
-              </a:rPr>
-              <a:t>######Model 3: Deeper RNN + </a:t>
-            </a:r>
-            <a:r>
-              <a:rPr lang="en-IN" b="0" dirty="0" err="1">
-                <a:solidFill>
-                  <a:srgbClr val="0000FF"/>
-                </a:solidFill>
-                <a:effectLst/>
-                <a:highlight>
-                  <a:srgbClr val="F7F7F7"/>
-                </a:highlight>
-                <a:latin typeface="Courier New" panose="02070309020205020404" pitchFamily="49" charset="0"/>
-              </a:rPr>
-              <a:t>TimeDistributed</a:t>
-            </a:r>
-            <a:r>
-              <a:rPr lang="en-IN" b="0" dirty="0">
-                <a:solidFill>
-                  <a:srgbClr val="0000FF"/>
-                </a:solidFill>
-                <a:effectLst/>
-                <a:highlight>
-                  <a:srgbClr val="F7F7F7"/>
-                </a:highlight>
-                <a:latin typeface="Courier New" panose="02070309020205020404" pitchFamily="49" charset="0"/>
-              </a:rPr>
-              <a:t> Dense</a:t>
-            </a:r>
-            <a:endParaRPr lang="en-IN" b="0" dirty="0">
-              <a:solidFill>
-                <a:srgbClr val="000000"/>
-              </a:solidFill>
-              <a:effectLst/>
-              <a:highlight>
-                <a:srgbClr val="F7F7F7"/>
-              </a:highlight>
-              <a:latin typeface="Courier New" panose="02070309020205020404" pitchFamily="49" charset="0"/>
-            </a:endParaRPr>
-          </a:p>
-          <a:p>
-            <a:r>
-              <a:rPr lang="en-IN" b="0" dirty="0">
-                <a:solidFill>
-                  <a:srgbClr val="0000FF"/>
-                </a:solidFill>
-                <a:effectLst/>
-                <a:highlight>
-                  <a:srgbClr val="F7F7F7"/>
-                </a:highlight>
-                <a:latin typeface="Courier New" panose="02070309020205020404" pitchFamily="49" charset="0"/>
-              </a:rPr>
-              <a:t>######Model 4: Bidirectional RNN + </a:t>
-            </a:r>
-            <a:r>
-              <a:rPr lang="en-IN" b="0" dirty="0" err="1">
-                <a:solidFill>
-                  <a:srgbClr val="0000FF"/>
-                </a:solidFill>
-                <a:effectLst/>
-                <a:highlight>
-                  <a:srgbClr val="F7F7F7"/>
-                </a:highlight>
-                <a:latin typeface="Courier New" panose="02070309020205020404" pitchFamily="49" charset="0"/>
-              </a:rPr>
-              <a:t>TimeDistributed</a:t>
-            </a:r>
-            <a:r>
-              <a:rPr lang="en-IN" b="0" dirty="0">
-                <a:solidFill>
-                  <a:srgbClr val="0000FF"/>
-                </a:solidFill>
-                <a:effectLst/>
-                <a:highlight>
-                  <a:srgbClr val="F7F7F7"/>
-                </a:highlight>
-                <a:latin typeface="Courier New" panose="02070309020205020404" pitchFamily="49" charset="0"/>
-              </a:rPr>
-              <a:t> Dense</a:t>
-            </a:r>
-            <a:endParaRPr lang="en-IN" b="0" dirty="0">
-              <a:solidFill>
-                <a:srgbClr val="000000"/>
-              </a:solidFill>
-              <a:effectLst/>
-              <a:highlight>
-                <a:srgbClr val="F7F7F7"/>
-              </a:highlight>
-              <a:latin typeface="Courier New" panose="02070309020205020404" pitchFamily="49" charset="0"/>
-            </a:endParaRPr>
+          <a:solidFill>
+            <a:schemeClr val="accent1"/>
+          </a:solidFill>
+          <a:ln>
+            <a:noFill/>
+          </a:ln>
+        </p:spPr>
+        <p:style>
+          <a:lnRef idx="2">
+            <a:schemeClr val="accent1">
+              <a:shade val="15000"/>
+            </a:schemeClr>
+          </a:lnRef>
+          <a:fillRef idx="1">
+            <a:schemeClr val="accent1"/>
+          </a:fillRef>
+          <a:effectRef idx="0">
+            <a:schemeClr val="accent1"/>
+          </a:effectRef>
+          <a:fontRef idx="minor">
+            <a:schemeClr val="lt1"/>
+          </a:fontRef>
+        </p:style>
+        <p:txBody>
+          <a:bodyPr rtlCol="0" anchor="ctr"/>
+          <a:lstStyle/>
+          <a:p>
+            <a:pPr algn="ctr"/>
+            <a:r>
+              <a:rPr lang="en-IN" sz="6000" dirty="0"/>
+              <a:t>Appendix</a:t>
+            </a:r>
           </a:p>
         </p:txBody>
       </p:sp>
     </p:spTree>
     <p:extLst>
       <p:ext uri="{BB962C8B-B14F-4D97-AF65-F5344CB8AC3E}">
-        <p14:creationId xmlns:p14="http://schemas.microsoft.com/office/powerpoint/2010/main" val="4276924105"/>
+        <p14:creationId xmlns:p14="http://schemas.microsoft.com/office/powerpoint/2010/main" val="3159226328"/>
       </p:ext>
     </p:extLst>
   </p:cSld>

</xml_diff>